<commit_message>
Worked on presentation and Synonyms.com
</commit_message>
<xml_diff>
--- a/JanEngler/Praktikum/Results Antonym generation.pptx
+++ b/JanEngler/Praktikum/Results Antonym generation.pptx
@@ -12,6 +12,18 @@
     <p:sldId id="260" r:id="rId6"/>
     <p:sldId id="261" r:id="rId7"/>
     <p:sldId id="262" r:id="rId8"/>
+    <p:sldId id="269" r:id="rId9"/>
+    <p:sldId id="264" r:id="rId10"/>
+    <p:sldId id="266" r:id="rId11"/>
+    <p:sldId id="270" r:id="rId12"/>
+    <p:sldId id="271" r:id="rId13"/>
+    <p:sldId id="272" r:id="rId14"/>
+    <p:sldId id="273" r:id="rId15"/>
+    <p:sldId id="274" r:id="rId16"/>
+    <p:sldId id="275" r:id="rId17"/>
+    <p:sldId id="276" r:id="rId18"/>
+    <p:sldId id="267" r:id="rId19"/>
+    <p:sldId id="268" r:id="rId20"/>
   </p:sldIdLst>
   <p:sldSz cx="12192000" cy="6858000"/>
   <p:notesSz cx="6858000" cy="9144000"/>
@@ -267,7 +279,7 @@
           <a:p>
             <a:fld id="{62091DF2-D8B8-4FAA-8179-4E88BB7075B9}" type="datetimeFigureOut">
               <a:rPr lang="en-US" smtClean="0"/>
-              <a:t>6/20/2020</a:t>
+              <a:t>6/23/2020</a:t>
             </a:fld>
             <a:endParaRPr lang="en-US"/>
           </a:p>
@@ -467,7 +479,7 @@
           <a:p>
             <a:fld id="{62091DF2-D8B8-4FAA-8179-4E88BB7075B9}" type="datetimeFigureOut">
               <a:rPr lang="en-US" smtClean="0"/>
-              <a:t>6/20/2020</a:t>
+              <a:t>6/23/2020</a:t>
             </a:fld>
             <a:endParaRPr lang="en-US"/>
           </a:p>
@@ -677,7 +689,7 @@
           <a:p>
             <a:fld id="{62091DF2-D8B8-4FAA-8179-4E88BB7075B9}" type="datetimeFigureOut">
               <a:rPr lang="en-US" smtClean="0"/>
-              <a:t>6/20/2020</a:t>
+              <a:t>6/23/2020</a:t>
             </a:fld>
             <a:endParaRPr lang="en-US"/>
           </a:p>
@@ -877,7 +889,7 @@
           <a:p>
             <a:fld id="{62091DF2-D8B8-4FAA-8179-4E88BB7075B9}" type="datetimeFigureOut">
               <a:rPr lang="en-US" smtClean="0"/>
-              <a:t>6/20/2020</a:t>
+              <a:t>6/23/2020</a:t>
             </a:fld>
             <a:endParaRPr lang="en-US"/>
           </a:p>
@@ -1153,7 +1165,7 @@
           <a:p>
             <a:fld id="{62091DF2-D8B8-4FAA-8179-4E88BB7075B9}" type="datetimeFigureOut">
               <a:rPr lang="en-US" smtClean="0"/>
-              <a:t>6/20/2020</a:t>
+              <a:t>6/23/2020</a:t>
             </a:fld>
             <a:endParaRPr lang="en-US"/>
           </a:p>
@@ -1421,7 +1433,7 @@
           <a:p>
             <a:fld id="{62091DF2-D8B8-4FAA-8179-4E88BB7075B9}" type="datetimeFigureOut">
               <a:rPr lang="en-US" smtClean="0"/>
-              <a:t>6/20/2020</a:t>
+              <a:t>6/23/2020</a:t>
             </a:fld>
             <a:endParaRPr lang="en-US"/>
           </a:p>
@@ -1836,7 +1848,7 @@
           <a:p>
             <a:fld id="{62091DF2-D8B8-4FAA-8179-4E88BB7075B9}" type="datetimeFigureOut">
               <a:rPr lang="en-US" smtClean="0"/>
-              <a:t>6/20/2020</a:t>
+              <a:t>6/23/2020</a:t>
             </a:fld>
             <a:endParaRPr lang="en-US"/>
           </a:p>
@@ -1978,7 +1990,7 @@
           <a:p>
             <a:fld id="{62091DF2-D8B8-4FAA-8179-4E88BB7075B9}" type="datetimeFigureOut">
               <a:rPr lang="en-US" smtClean="0"/>
-              <a:t>6/20/2020</a:t>
+              <a:t>6/23/2020</a:t>
             </a:fld>
             <a:endParaRPr lang="en-US"/>
           </a:p>
@@ -2091,7 +2103,7 @@
           <a:p>
             <a:fld id="{62091DF2-D8B8-4FAA-8179-4E88BB7075B9}" type="datetimeFigureOut">
               <a:rPr lang="en-US" smtClean="0"/>
-              <a:t>6/20/2020</a:t>
+              <a:t>6/23/2020</a:t>
             </a:fld>
             <a:endParaRPr lang="en-US"/>
           </a:p>
@@ -2404,7 +2416,7 @@
           <a:p>
             <a:fld id="{62091DF2-D8B8-4FAA-8179-4E88BB7075B9}" type="datetimeFigureOut">
               <a:rPr lang="en-US" smtClean="0"/>
-              <a:t>6/20/2020</a:t>
+              <a:t>6/23/2020</a:t>
             </a:fld>
             <a:endParaRPr lang="en-US"/>
           </a:p>
@@ -2693,7 +2705,7 @@
           <a:p>
             <a:fld id="{62091DF2-D8B8-4FAA-8179-4E88BB7075B9}" type="datetimeFigureOut">
               <a:rPr lang="en-US" smtClean="0"/>
-              <a:t>6/20/2020</a:t>
+              <a:t>6/23/2020</a:t>
             </a:fld>
             <a:endParaRPr lang="en-US"/>
           </a:p>
@@ -2936,7 +2948,7 @@
           <a:p>
             <a:fld id="{62091DF2-D8B8-4FAA-8179-4E88BB7075B9}" type="datetimeFigureOut">
               <a:rPr lang="en-US" smtClean="0"/>
-              <a:t>6/20/2020</a:t>
+              <a:t>6/23/2020</a:t>
             </a:fld>
             <a:endParaRPr lang="en-US"/>
           </a:p>
@@ -3419,6 +3431,1450 @@
 </p:sld>
 </file>
 
+<file path=ppt/slides/slide10.xml><?xml version="1.0" encoding="utf-8"?>
+<p:sld xmlns:a="http://schemas.openxmlformats.org/drawingml/2006/main" xmlns:r="http://schemas.openxmlformats.org/officeDocument/2006/relationships" xmlns:p="http://schemas.openxmlformats.org/presentationml/2006/main">
+  <p:cSld>
+    <p:spTree>
+      <p:nvGrpSpPr>
+        <p:cNvPr id="1" name=""/>
+        <p:cNvGrpSpPr/>
+        <p:nvPr/>
+      </p:nvGrpSpPr>
+      <p:grpSpPr>
+        <a:xfrm>
+          <a:off x="0" y="0"/>
+          <a:ext cx="0" cy="0"/>
+          <a:chOff x="0" y="0"/>
+          <a:chExt cx="0" cy="0"/>
+        </a:xfrm>
+      </p:grpSpPr>
+      <p:sp>
+        <p:nvSpPr>
+          <p:cNvPr id="2" name="Titel 1">
+            <a:extLst>
+              <a:ext uri="{FF2B5EF4-FFF2-40B4-BE49-F238E27FC236}">
+                <a16:creationId xmlns:a16="http://schemas.microsoft.com/office/drawing/2014/main" id="{629246B2-C9F7-4238-83E0-22662DB8A8E9}"/>
+              </a:ext>
+            </a:extLst>
+          </p:cNvPr>
+          <p:cNvSpPr>
+            <a:spLocks noGrp="1"/>
+          </p:cNvSpPr>
+          <p:nvPr>
+            <p:ph type="title"/>
+          </p:nvPr>
+        </p:nvSpPr>
+        <p:spPr/>
+        <p:txBody>
+          <a:bodyPr/>
+          <a:lstStyle/>
+          <a:p>
+            <a:r>
+              <a:rPr lang="en-US" dirty="0"/>
+              <a:t>Still, generated antonyms are too general</a:t>
+            </a:r>
+          </a:p>
+        </p:txBody>
+      </p:sp>
+      <p:sp>
+        <p:nvSpPr>
+          <p:cNvPr id="3" name="Inhaltsplatzhalter 2">
+            <a:extLst>
+              <a:ext uri="{FF2B5EF4-FFF2-40B4-BE49-F238E27FC236}">
+                <a16:creationId xmlns:a16="http://schemas.microsoft.com/office/drawing/2014/main" id="{6A794220-35D0-4B54-B292-642366D3A050}"/>
+              </a:ext>
+            </a:extLst>
+          </p:cNvPr>
+          <p:cNvSpPr>
+            <a:spLocks noGrp="1"/>
+          </p:cNvSpPr>
+          <p:nvPr>
+            <p:ph idx="1"/>
+          </p:nvPr>
+        </p:nvSpPr>
+        <p:spPr/>
+        <p:txBody>
+          <a:bodyPr>
+            <a:normAutofit/>
+          </a:bodyPr>
+          <a:lstStyle/>
+          <a:p>
+            <a:r>
+              <a:rPr lang="en-US" altLang="en-US" dirty="0">
+                <a:solidFill>
+                  <a:srgbClr val="000000"/>
+                </a:solidFill>
+                <a:latin typeface="Arial Unicode MS"/>
+                <a:ea typeface="Courier New" panose="02070309020205020404" pitchFamily="49" charset="0"/>
+              </a:rPr>
+              <a:t>('boggy', 'dry') ('downy', 'hard') ('conciliatory', 'cutting') ('bounded', 'immeasurable') ('dim', 'white') ('evaporated', 'liquid') ('purple', 'yellow') ('unexploded', 'unloaded') ('pleasing', 'ugly') ('broken', 'entire') ('loaded', 'unloaded') ('company', 'loneliness') ('comfortable', 'warm') ('loathsome', 'wholesome') ('entirety', 'grain') ('green', 'red') ('shell', 'soft') ('finite', 'immeasurable') ('brief', 'immeasurable') </a:t>
+            </a:r>
+            <a:r>
+              <a:rPr lang="en-US" altLang="en-US" dirty="0">
+                <a:solidFill>
+                  <a:srgbClr val="FF0000"/>
+                </a:solidFill>
+                <a:latin typeface="Arial Unicode MS"/>
+                <a:ea typeface="Courier New" panose="02070309020205020404" pitchFamily="49" charset="0"/>
+              </a:rPr>
+              <a:t>('dried', 'wet')</a:t>
+            </a:r>
+            <a:r>
+              <a:rPr lang="en-US" altLang="en-US" dirty="0">
+                <a:solidFill>
+                  <a:srgbClr val="000000"/>
+                </a:solidFill>
+                <a:latin typeface="Arial Unicode MS"/>
+                <a:ea typeface="Courier New" panose="02070309020205020404" pitchFamily="49" charset="0"/>
+              </a:rPr>
+              <a:t> ('excellent', 'inferior') ('dappled', 'plain') ('lovely', 'ugly') </a:t>
+            </a:r>
+            <a:r>
+              <a:rPr lang="en-US" altLang="en-US" dirty="0">
+                <a:solidFill>
+                  <a:srgbClr val="FF0000"/>
+                </a:solidFill>
+                <a:latin typeface="Arial Unicode MS"/>
+                <a:ea typeface="Courier New" panose="02070309020205020404" pitchFamily="49" charset="0"/>
+              </a:rPr>
+              <a:t>('freezing', 'hot') </a:t>
+            </a:r>
+            <a:r>
+              <a:rPr lang="en-US" altLang="en-US" dirty="0">
+                <a:solidFill>
+                  <a:srgbClr val="000000"/>
+                </a:solidFill>
+                <a:latin typeface="Arial Unicode MS"/>
+                <a:ea typeface="Courier New" panose="02070309020205020404" pitchFamily="49" charset="0"/>
+              </a:rPr>
+              <a:t>('neutral', 'pink') ('tall', 'thick') </a:t>
+            </a:r>
+            <a:r>
+              <a:rPr lang="en-US" altLang="en-US" dirty="0">
+                <a:solidFill>
+                  <a:srgbClr val="FF0000"/>
+                </a:solidFill>
+                <a:latin typeface="Arial Unicode MS"/>
+                <a:ea typeface="Courier New" panose="02070309020205020404" pitchFamily="49" charset="0"/>
+              </a:rPr>
+              <a:t>('processed', 'unprocessed') </a:t>
+            </a:r>
+            <a:r>
+              <a:rPr lang="en-US" altLang="en-US" dirty="0">
+                <a:solidFill>
+                  <a:srgbClr val="000000"/>
+                </a:solidFill>
+                <a:latin typeface="Arial Unicode MS"/>
+                <a:ea typeface="Courier New" panose="02070309020205020404" pitchFamily="49" charset="0"/>
+              </a:rPr>
+              <a:t>('empty', 'rich') ('aggregate', 'grain') ('coarse', 'delicious') </a:t>
+            </a:r>
+            <a:r>
+              <a:rPr lang="en-US" altLang="en-US" dirty="0">
+                <a:solidFill>
+                  <a:srgbClr val="FF0000"/>
+                </a:solidFill>
+                <a:latin typeface="Arial Unicode MS"/>
+                <a:ea typeface="Courier New" panose="02070309020205020404" pitchFamily="49" charset="0"/>
+              </a:rPr>
+              <a:t>('preserved', 'unprocessed')</a:t>
+            </a:r>
+            <a:r>
+              <a:rPr lang="en-US" altLang="en-US" dirty="0">
+                <a:solidFill>
+                  <a:srgbClr val="000000"/>
+                </a:solidFill>
+                <a:latin typeface="Arial Unicode MS"/>
+                <a:ea typeface="Courier New" panose="02070309020205020404" pitchFamily="49" charset="0"/>
+              </a:rPr>
+              <a:t> ('insoluble', 'liquid') ('metal', 'nonmetal')</a:t>
+            </a:r>
+            <a:r>
+              <a:rPr lang="en-US" altLang="en-US" sz="2000" dirty="0"/>
+              <a:t> </a:t>
+            </a:r>
+            <a:endParaRPr lang="en-US" altLang="en-US" sz="5400" dirty="0">
+              <a:latin typeface="Arial" panose="020B0604020202020204" pitchFamily="34" charset="0"/>
+            </a:endParaRPr>
+          </a:p>
+          <a:p>
+            <a:endParaRPr lang="en-US" dirty="0"/>
+          </a:p>
+        </p:txBody>
+      </p:sp>
+    </p:spTree>
+    <p:extLst>
+      <p:ext uri="{BB962C8B-B14F-4D97-AF65-F5344CB8AC3E}">
+        <p14:creationId xmlns:p14="http://schemas.microsoft.com/office/powerpoint/2010/main" val="768288382"/>
+      </p:ext>
+    </p:extLst>
+  </p:cSld>
+  <p:clrMapOvr>
+    <a:masterClrMapping/>
+  </p:clrMapOvr>
+</p:sld>
+</file>
+
+<file path=ppt/slides/slide11.xml><?xml version="1.0" encoding="utf-8"?>
+<p:sld xmlns:a="http://schemas.openxmlformats.org/drawingml/2006/main" xmlns:r="http://schemas.openxmlformats.org/officeDocument/2006/relationships" xmlns:p="http://schemas.openxmlformats.org/presentationml/2006/main">
+  <p:cSld>
+    <p:spTree>
+      <p:nvGrpSpPr>
+        <p:cNvPr id="1" name=""/>
+        <p:cNvGrpSpPr/>
+        <p:nvPr/>
+      </p:nvGrpSpPr>
+      <p:grpSpPr>
+        <a:xfrm>
+          <a:off x="0" y="0"/>
+          <a:ext cx="0" cy="0"/>
+          <a:chOff x="0" y="0"/>
+          <a:chExt cx="0" cy="0"/>
+        </a:xfrm>
+      </p:grpSpPr>
+      <p:sp>
+        <p:nvSpPr>
+          <p:cNvPr id="2" name="Titel 1">
+            <a:extLst>
+              <a:ext uri="{FF2B5EF4-FFF2-40B4-BE49-F238E27FC236}">
+                <a16:creationId xmlns:a16="http://schemas.microsoft.com/office/drawing/2014/main" id="{EF61F6F4-9273-459C-B2FE-FC84595071FC}"/>
+              </a:ext>
+            </a:extLst>
+          </p:cNvPr>
+          <p:cNvSpPr>
+            <a:spLocks noGrp="1"/>
+          </p:cNvSpPr>
+          <p:nvPr>
+            <p:ph type="title"/>
+          </p:nvPr>
+        </p:nvSpPr>
+        <p:spPr/>
+        <p:txBody>
+          <a:bodyPr/>
+          <a:lstStyle/>
+          <a:p>
+            <a:endParaRPr lang="en-US" dirty="0"/>
+          </a:p>
+        </p:txBody>
+      </p:sp>
+      <p:sp>
+        <p:nvSpPr>
+          <p:cNvPr id="3" name="Inhaltsplatzhalter 2">
+            <a:extLst>
+              <a:ext uri="{FF2B5EF4-FFF2-40B4-BE49-F238E27FC236}">
+                <a16:creationId xmlns:a16="http://schemas.microsoft.com/office/drawing/2014/main" id="{9062681E-458E-45AB-941F-6C0938807EE9}"/>
+              </a:ext>
+            </a:extLst>
+          </p:cNvPr>
+          <p:cNvSpPr>
+            <a:spLocks noGrp="1"/>
+          </p:cNvSpPr>
+          <p:nvPr>
+            <p:ph idx="1"/>
+          </p:nvPr>
+        </p:nvSpPr>
+        <p:spPr/>
+        <p:txBody>
+          <a:bodyPr/>
+          <a:lstStyle/>
+          <a:p>
+            <a:r>
+              <a:rPr lang="en-US" dirty="0"/>
+              <a:t>Just in https://en.wikipedia.org/wiki/United_States the word Spanish appears 22 times. “</a:t>
+            </a:r>
+            <a:r>
+              <a:rPr lang="en-US" dirty="0" err="1"/>
+              <a:t>english</a:t>
+            </a:r>
+            <a:r>
+              <a:rPr lang="en-US" dirty="0"/>
+              <a:t>” just 21 times.</a:t>
+            </a:r>
+          </a:p>
+        </p:txBody>
+      </p:sp>
+    </p:spTree>
+    <p:extLst>
+      <p:ext uri="{BB962C8B-B14F-4D97-AF65-F5344CB8AC3E}">
+        <p14:creationId xmlns:p14="http://schemas.microsoft.com/office/powerpoint/2010/main" val="127591700"/>
+      </p:ext>
+    </p:extLst>
+  </p:cSld>
+  <p:clrMapOvr>
+    <a:masterClrMapping/>
+  </p:clrMapOvr>
+</p:sld>
+</file>
+
+<file path=ppt/slides/slide12.xml><?xml version="1.0" encoding="utf-8"?>
+<p:sld xmlns:a="http://schemas.openxmlformats.org/drawingml/2006/main" xmlns:r="http://schemas.openxmlformats.org/officeDocument/2006/relationships" xmlns:p="http://schemas.openxmlformats.org/presentationml/2006/main">
+  <p:cSld>
+    <p:spTree>
+      <p:nvGrpSpPr>
+        <p:cNvPr id="1" name=""/>
+        <p:cNvGrpSpPr/>
+        <p:nvPr/>
+      </p:nvGrpSpPr>
+      <p:grpSpPr>
+        <a:xfrm>
+          <a:off x="0" y="0"/>
+          <a:ext cx="0" cy="0"/>
+          <a:chOff x="0" y="0"/>
+          <a:chExt cx="0" cy="0"/>
+        </a:xfrm>
+      </p:grpSpPr>
+      <p:sp>
+        <p:nvSpPr>
+          <p:cNvPr id="4" name="Titel 3">
+            <a:extLst>
+              <a:ext uri="{FF2B5EF4-FFF2-40B4-BE49-F238E27FC236}">
+                <a16:creationId xmlns:a16="http://schemas.microsoft.com/office/drawing/2014/main" id="{D1DC45C2-EFCA-46A5-AA5B-A8A4B945DA49}"/>
+              </a:ext>
+            </a:extLst>
+          </p:cNvPr>
+          <p:cNvSpPr>
+            <a:spLocks noGrp="1"/>
+          </p:cNvSpPr>
+          <p:nvPr>
+            <p:ph type="title"/>
+          </p:nvPr>
+        </p:nvSpPr>
+        <p:spPr/>
+        <p:txBody>
+          <a:bodyPr/>
+          <a:lstStyle/>
+          <a:p>
+            <a:r>
+              <a:rPr lang="en-US" dirty="0"/>
+              <a:t>USA</a:t>
+            </a:r>
+          </a:p>
+        </p:txBody>
+      </p:sp>
+      <p:pic>
+        <p:nvPicPr>
+          <p:cNvPr id="8" name="Inhaltsplatzhalter 7" descr="Ein Bild, das groß, Personen, rot enthält.&#10;&#10;Automatisch generierte Beschreibung">
+            <a:extLst>
+              <a:ext uri="{FF2B5EF4-FFF2-40B4-BE49-F238E27FC236}">
+                <a16:creationId xmlns:a16="http://schemas.microsoft.com/office/drawing/2014/main" id="{F911E9C6-38B9-4BA8-9120-4C1F9A2C656A}"/>
+              </a:ext>
+            </a:extLst>
+          </p:cNvPr>
+          <p:cNvPicPr>
+            <a:picLocks noGrp="1" noChangeAspect="1"/>
+          </p:cNvPicPr>
+          <p:nvPr>
+            <p:ph sz="half" idx="1"/>
+          </p:nvPr>
+        </p:nvPicPr>
+        <p:blipFill>
+          <a:blip r:embed="rId2">
+            <a:extLst>
+              <a:ext uri="{28A0092B-C50C-407E-A947-70E740481C1C}">
+                <a14:useLocalDpi xmlns:a14="http://schemas.microsoft.com/office/drawing/2010/main" val="0"/>
+              </a:ext>
+            </a:extLst>
+          </a:blip>
+          <a:stretch>
+            <a:fillRect/>
+          </a:stretch>
+        </p:blipFill>
+        <p:spPr>
+          <a:xfrm>
+            <a:off x="617342" y="1825625"/>
+            <a:ext cx="3160033" cy="4351338"/>
+          </a:xfrm>
+        </p:spPr>
+      </p:pic>
+      <p:pic>
+        <p:nvPicPr>
+          <p:cNvPr id="10" name="Inhaltsplatzhalter 9" descr="Ein Bild, das weiß enthält.&#10;&#10;Automatisch generierte Beschreibung">
+            <a:extLst>
+              <a:ext uri="{FF2B5EF4-FFF2-40B4-BE49-F238E27FC236}">
+                <a16:creationId xmlns:a16="http://schemas.microsoft.com/office/drawing/2014/main" id="{29B246A0-0AB2-4015-AF25-CE62AFE65763}"/>
+              </a:ext>
+            </a:extLst>
+          </p:cNvPr>
+          <p:cNvPicPr>
+            <a:picLocks noGrp="1" noChangeAspect="1"/>
+          </p:cNvPicPr>
+          <p:nvPr>
+            <p:ph sz="half" idx="2"/>
+          </p:nvPr>
+        </p:nvPicPr>
+        <p:blipFill>
+          <a:blip r:embed="rId3">
+            <a:extLst>
+              <a:ext uri="{28A0092B-C50C-407E-A947-70E740481C1C}">
+                <a14:useLocalDpi xmlns:a14="http://schemas.microsoft.com/office/drawing/2010/main" val="0"/>
+              </a:ext>
+            </a:extLst>
+          </a:blip>
+          <a:stretch>
+            <a:fillRect/>
+          </a:stretch>
+        </p:blipFill>
+        <p:spPr>
+          <a:xfrm>
+            <a:off x="4377265" y="1825625"/>
+            <a:ext cx="3154440" cy="4351338"/>
+          </a:xfrm>
+        </p:spPr>
+      </p:pic>
+      <p:pic>
+        <p:nvPicPr>
+          <p:cNvPr id="12" name="Grafik 11">
+            <a:extLst>
+              <a:ext uri="{FF2B5EF4-FFF2-40B4-BE49-F238E27FC236}">
+                <a16:creationId xmlns:a16="http://schemas.microsoft.com/office/drawing/2014/main" id="{489AAF12-9229-4473-89C4-42DEC6D18D58}"/>
+              </a:ext>
+            </a:extLst>
+          </p:cNvPr>
+          <p:cNvPicPr>
+            <a:picLocks noChangeAspect="1"/>
+          </p:cNvPicPr>
+          <p:nvPr/>
+        </p:nvPicPr>
+        <p:blipFill>
+          <a:blip r:embed="rId4">
+            <a:extLst>
+              <a:ext uri="{28A0092B-C50C-407E-A947-70E740481C1C}">
+                <a14:useLocalDpi xmlns:a14="http://schemas.microsoft.com/office/drawing/2010/main" val="0"/>
+              </a:ext>
+            </a:extLst>
+          </a:blip>
+          <a:stretch>
+            <a:fillRect/>
+          </a:stretch>
+        </p:blipFill>
+        <p:spPr>
+          <a:xfrm>
+            <a:off x="7741593" y="1911623"/>
+            <a:ext cx="3305852" cy="4498507"/>
+          </a:xfrm>
+          <a:prstGeom prst="rect">
+            <a:avLst/>
+          </a:prstGeom>
+        </p:spPr>
+      </p:pic>
+    </p:spTree>
+    <p:extLst>
+      <p:ext uri="{BB962C8B-B14F-4D97-AF65-F5344CB8AC3E}">
+        <p14:creationId xmlns:p14="http://schemas.microsoft.com/office/powerpoint/2010/main" val="1250574755"/>
+      </p:ext>
+    </p:extLst>
+  </p:cSld>
+  <p:clrMapOvr>
+    <a:masterClrMapping/>
+  </p:clrMapOvr>
+</p:sld>
+</file>
+
+<file path=ppt/slides/slide13.xml><?xml version="1.0" encoding="utf-8"?>
+<p:sld xmlns:a="http://schemas.openxmlformats.org/drawingml/2006/main" xmlns:r="http://schemas.openxmlformats.org/officeDocument/2006/relationships" xmlns:p="http://schemas.openxmlformats.org/presentationml/2006/main">
+  <p:cSld>
+    <p:spTree>
+      <p:nvGrpSpPr>
+        <p:cNvPr id="1" name=""/>
+        <p:cNvGrpSpPr/>
+        <p:nvPr/>
+      </p:nvGrpSpPr>
+      <p:grpSpPr>
+        <a:xfrm>
+          <a:off x="0" y="0"/>
+          <a:ext cx="0" cy="0"/>
+          <a:chOff x="0" y="0"/>
+          <a:chExt cx="0" cy="0"/>
+        </a:xfrm>
+      </p:grpSpPr>
+      <p:sp>
+        <p:nvSpPr>
+          <p:cNvPr id="2" name="Titel 1">
+            <a:extLst>
+              <a:ext uri="{FF2B5EF4-FFF2-40B4-BE49-F238E27FC236}">
+                <a16:creationId xmlns:a16="http://schemas.microsoft.com/office/drawing/2014/main" id="{8341CD96-CF86-4036-8A82-FA96FE6B4238}"/>
+              </a:ext>
+            </a:extLst>
+          </p:cNvPr>
+          <p:cNvSpPr>
+            <a:spLocks noGrp="1"/>
+          </p:cNvSpPr>
+          <p:nvPr>
+            <p:ph type="title"/>
+          </p:nvPr>
+        </p:nvSpPr>
+        <p:spPr/>
+        <p:txBody>
+          <a:bodyPr/>
+          <a:lstStyle/>
+          <a:p>
+            <a:r>
+              <a:rPr lang="en-US" dirty="0"/>
+              <a:t>GERMANY</a:t>
+            </a:r>
+          </a:p>
+        </p:txBody>
+      </p:sp>
+      <p:pic>
+        <p:nvPicPr>
+          <p:cNvPr id="5" name="Inhaltsplatzhalter 4">
+            <a:extLst>
+              <a:ext uri="{FF2B5EF4-FFF2-40B4-BE49-F238E27FC236}">
+                <a16:creationId xmlns:a16="http://schemas.microsoft.com/office/drawing/2014/main" id="{9CCC4F24-52A4-48BF-926A-EA1E6363FD69}"/>
+              </a:ext>
+            </a:extLst>
+          </p:cNvPr>
+          <p:cNvPicPr>
+            <a:picLocks noGrp="1" noChangeAspect="1"/>
+          </p:cNvPicPr>
+          <p:nvPr>
+            <p:ph idx="1"/>
+          </p:nvPr>
+        </p:nvPicPr>
+        <p:blipFill>
+          <a:blip r:embed="rId2">
+            <a:extLst>
+              <a:ext uri="{28A0092B-C50C-407E-A947-70E740481C1C}">
+                <a14:useLocalDpi xmlns:a14="http://schemas.microsoft.com/office/drawing/2010/main" val="0"/>
+              </a:ext>
+            </a:extLst>
+          </a:blip>
+          <a:stretch>
+            <a:fillRect/>
+          </a:stretch>
+        </p:blipFill>
+        <p:spPr>
+          <a:xfrm>
+            <a:off x="713772" y="1690688"/>
+            <a:ext cx="3187998" cy="4351338"/>
+          </a:xfrm>
+        </p:spPr>
+      </p:pic>
+      <p:pic>
+        <p:nvPicPr>
+          <p:cNvPr id="7" name="Grafik 6">
+            <a:extLst>
+              <a:ext uri="{FF2B5EF4-FFF2-40B4-BE49-F238E27FC236}">
+                <a16:creationId xmlns:a16="http://schemas.microsoft.com/office/drawing/2014/main" id="{645EC427-6FFE-496C-A8E0-78F3F3C0430D}"/>
+              </a:ext>
+            </a:extLst>
+          </p:cNvPr>
+          <p:cNvPicPr>
+            <a:picLocks noChangeAspect="1"/>
+          </p:cNvPicPr>
+          <p:nvPr/>
+        </p:nvPicPr>
+        <p:blipFill>
+          <a:blip r:embed="rId3">
+            <a:extLst>
+              <a:ext uri="{28A0092B-C50C-407E-A947-70E740481C1C}">
+                <a14:useLocalDpi xmlns:a14="http://schemas.microsoft.com/office/drawing/2010/main" val="0"/>
+              </a:ext>
+            </a:extLst>
+          </a:blip>
+          <a:stretch>
+            <a:fillRect/>
+          </a:stretch>
+        </p:blipFill>
+        <p:spPr>
+          <a:xfrm>
+            <a:off x="3221646" y="1782148"/>
+            <a:ext cx="4168751" cy="4351338"/>
+          </a:xfrm>
+          <a:prstGeom prst="rect">
+            <a:avLst/>
+          </a:prstGeom>
+        </p:spPr>
+      </p:pic>
+      <p:pic>
+        <p:nvPicPr>
+          <p:cNvPr id="9" name="Grafik 8">
+            <a:extLst>
+              <a:ext uri="{FF2B5EF4-FFF2-40B4-BE49-F238E27FC236}">
+                <a16:creationId xmlns:a16="http://schemas.microsoft.com/office/drawing/2014/main" id="{1A1E6D2D-054A-4ADD-855C-734AADCF64E9}"/>
+              </a:ext>
+            </a:extLst>
+          </p:cNvPr>
+          <p:cNvPicPr>
+            <a:picLocks noChangeAspect="1"/>
+          </p:cNvPicPr>
+          <p:nvPr/>
+        </p:nvPicPr>
+        <p:blipFill>
+          <a:blip r:embed="rId4">
+            <a:extLst>
+              <a:ext uri="{28A0092B-C50C-407E-A947-70E740481C1C}">
+                <a14:useLocalDpi xmlns:a14="http://schemas.microsoft.com/office/drawing/2010/main" val="0"/>
+              </a:ext>
+            </a:extLst>
+          </a:blip>
+          <a:stretch>
+            <a:fillRect/>
+          </a:stretch>
+        </p:blipFill>
+        <p:spPr>
+          <a:xfrm>
+            <a:off x="8357525" y="1909503"/>
+            <a:ext cx="3081492" cy="4351338"/>
+          </a:xfrm>
+          <a:prstGeom prst="rect">
+            <a:avLst/>
+          </a:prstGeom>
+        </p:spPr>
+      </p:pic>
+    </p:spTree>
+    <p:extLst>
+      <p:ext uri="{BB962C8B-B14F-4D97-AF65-F5344CB8AC3E}">
+        <p14:creationId xmlns:p14="http://schemas.microsoft.com/office/powerpoint/2010/main" val="363892552"/>
+      </p:ext>
+    </p:extLst>
+  </p:cSld>
+  <p:clrMapOvr>
+    <a:masterClrMapping/>
+  </p:clrMapOvr>
+</p:sld>
+</file>
+
+<file path=ppt/slides/slide14.xml><?xml version="1.0" encoding="utf-8"?>
+<p:sld xmlns:a="http://schemas.openxmlformats.org/drawingml/2006/main" xmlns:r="http://schemas.openxmlformats.org/officeDocument/2006/relationships" xmlns:p="http://schemas.openxmlformats.org/presentationml/2006/main">
+  <p:cSld>
+    <p:spTree>
+      <p:nvGrpSpPr>
+        <p:cNvPr id="1" name=""/>
+        <p:cNvGrpSpPr/>
+        <p:nvPr/>
+      </p:nvGrpSpPr>
+      <p:grpSpPr>
+        <a:xfrm>
+          <a:off x="0" y="0"/>
+          <a:ext cx="0" cy="0"/>
+          <a:chOff x="0" y="0"/>
+          <a:chExt cx="0" cy="0"/>
+        </a:xfrm>
+      </p:grpSpPr>
+      <p:sp>
+        <p:nvSpPr>
+          <p:cNvPr id="2" name="Titel 1">
+            <a:extLst>
+              <a:ext uri="{FF2B5EF4-FFF2-40B4-BE49-F238E27FC236}">
+                <a16:creationId xmlns:a16="http://schemas.microsoft.com/office/drawing/2014/main" id="{BB74EA61-4224-4009-B66B-33AD7ACF0D74}"/>
+              </a:ext>
+            </a:extLst>
+          </p:cNvPr>
+          <p:cNvSpPr>
+            <a:spLocks noGrp="1"/>
+          </p:cNvSpPr>
+          <p:nvPr>
+            <p:ph type="title"/>
+          </p:nvPr>
+        </p:nvSpPr>
+        <p:spPr/>
+        <p:txBody>
+          <a:bodyPr/>
+          <a:lstStyle/>
+          <a:p>
+            <a:r>
+              <a:rPr lang="en-US" dirty="0"/>
+              <a:t>China</a:t>
+            </a:r>
+          </a:p>
+        </p:txBody>
+      </p:sp>
+      <p:pic>
+        <p:nvPicPr>
+          <p:cNvPr id="5" name="Inhaltsplatzhalter 4" descr="Ein Bild, das Computer, Laptop, groß, weiß enthält.&#10;&#10;Automatisch generierte Beschreibung">
+            <a:extLst>
+              <a:ext uri="{FF2B5EF4-FFF2-40B4-BE49-F238E27FC236}">
+                <a16:creationId xmlns:a16="http://schemas.microsoft.com/office/drawing/2014/main" id="{B388E2A2-98BB-40B4-9B1E-9D0C73C37404}"/>
+              </a:ext>
+            </a:extLst>
+          </p:cNvPr>
+          <p:cNvPicPr>
+            <a:picLocks noGrp="1" noChangeAspect="1"/>
+          </p:cNvPicPr>
+          <p:nvPr>
+            <p:ph idx="1"/>
+          </p:nvPr>
+        </p:nvPicPr>
+        <p:blipFill>
+          <a:blip r:embed="rId2">
+            <a:extLst>
+              <a:ext uri="{28A0092B-C50C-407E-A947-70E740481C1C}">
+                <a14:useLocalDpi xmlns:a14="http://schemas.microsoft.com/office/drawing/2010/main" val="0"/>
+              </a:ext>
+            </a:extLst>
+          </a:blip>
+          <a:stretch>
+            <a:fillRect/>
+          </a:stretch>
+        </p:blipFill>
+        <p:spPr>
+          <a:xfrm>
+            <a:off x="767397" y="1611021"/>
+            <a:ext cx="3342006" cy="4351338"/>
+          </a:xfrm>
+        </p:spPr>
+      </p:pic>
+      <p:pic>
+        <p:nvPicPr>
+          <p:cNvPr id="7" name="Grafik 6" descr="Ein Bild, das Screenshot enthält.&#10;&#10;Automatisch generierte Beschreibung">
+            <a:extLst>
+              <a:ext uri="{FF2B5EF4-FFF2-40B4-BE49-F238E27FC236}">
+                <a16:creationId xmlns:a16="http://schemas.microsoft.com/office/drawing/2014/main" id="{51302222-9B75-455F-BC8A-C7155736AABE}"/>
+              </a:ext>
+            </a:extLst>
+          </p:cNvPr>
+          <p:cNvPicPr>
+            <a:picLocks noChangeAspect="1"/>
+          </p:cNvPicPr>
+          <p:nvPr/>
+        </p:nvPicPr>
+        <p:blipFill>
+          <a:blip r:embed="rId3">
+            <a:extLst>
+              <a:ext uri="{28A0092B-C50C-407E-A947-70E740481C1C}">
+                <a14:useLocalDpi xmlns:a14="http://schemas.microsoft.com/office/drawing/2010/main" val="0"/>
+              </a:ext>
+            </a:extLst>
+          </a:blip>
+          <a:stretch>
+            <a:fillRect/>
+          </a:stretch>
+        </p:blipFill>
+        <p:spPr>
+          <a:xfrm>
+            <a:off x="3926876" y="1474912"/>
+            <a:ext cx="4338248" cy="4487447"/>
+          </a:xfrm>
+          <a:prstGeom prst="rect">
+            <a:avLst/>
+          </a:prstGeom>
+        </p:spPr>
+      </p:pic>
+      <p:pic>
+        <p:nvPicPr>
+          <p:cNvPr id="9" name="Grafik 8">
+            <a:extLst>
+              <a:ext uri="{FF2B5EF4-FFF2-40B4-BE49-F238E27FC236}">
+                <a16:creationId xmlns:a16="http://schemas.microsoft.com/office/drawing/2014/main" id="{96E3AF68-A3D1-4F64-9C58-2A680024D850}"/>
+              </a:ext>
+            </a:extLst>
+          </p:cNvPr>
+          <p:cNvPicPr>
+            <a:picLocks noChangeAspect="1"/>
+          </p:cNvPicPr>
+          <p:nvPr/>
+        </p:nvPicPr>
+        <p:blipFill>
+          <a:blip r:embed="rId4">
+            <a:extLst>
+              <a:ext uri="{28A0092B-C50C-407E-A947-70E740481C1C}">
+                <a14:useLocalDpi xmlns:a14="http://schemas.microsoft.com/office/drawing/2010/main" val="0"/>
+              </a:ext>
+            </a:extLst>
+          </a:blip>
+          <a:stretch>
+            <a:fillRect/>
+          </a:stretch>
+        </p:blipFill>
+        <p:spPr>
+          <a:xfrm>
+            <a:off x="8902512" y="1922204"/>
+            <a:ext cx="2860699" cy="4040155"/>
+          </a:xfrm>
+          <a:prstGeom prst="rect">
+            <a:avLst/>
+          </a:prstGeom>
+        </p:spPr>
+      </p:pic>
+    </p:spTree>
+    <p:extLst>
+      <p:ext uri="{BB962C8B-B14F-4D97-AF65-F5344CB8AC3E}">
+        <p14:creationId xmlns:p14="http://schemas.microsoft.com/office/powerpoint/2010/main" val="2312665027"/>
+      </p:ext>
+    </p:extLst>
+  </p:cSld>
+  <p:clrMapOvr>
+    <a:masterClrMapping/>
+  </p:clrMapOvr>
+</p:sld>
+</file>
+
+<file path=ppt/slides/slide15.xml><?xml version="1.0" encoding="utf-8"?>
+<p:sld xmlns:a="http://schemas.openxmlformats.org/drawingml/2006/main" xmlns:r="http://schemas.openxmlformats.org/officeDocument/2006/relationships" xmlns:p="http://schemas.openxmlformats.org/presentationml/2006/main">
+  <p:cSld>
+    <p:spTree>
+      <p:nvGrpSpPr>
+        <p:cNvPr id="1" name=""/>
+        <p:cNvGrpSpPr/>
+        <p:nvPr/>
+      </p:nvGrpSpPr>
+      <p:grpSpPr>
+        <a:xfrm>
+          <a:off x="0" y="0"/>
+          <a:ext cx="0" cy="0"/>
+          <a:chOff x="0" y="0"/>
+          <a:chExt cx="0" cy="0"/>
+        </a:xfrm>
+      </p:grpSpPr>
+      <p:sp>
+        <p:nvSpPr>
+          <p:cNvPr id="2" name="Titel 1">
+            <a:extLst>
+              <a:ext uri="{FF2B5EF4-FFF2-40B4-BE49-F238E27FC236}">
+                <a16:creationId xmlns:a16="http://schemas.microsoft.com/office/drawing/2014/main" id="{7115F162-6725-400E-BC0D-53EA1B65844C}"/>
+              </a:ext>
+            </a:extLst>
+          </p:cNvPr>
+          <p:cNvSpPr>
+            <a:spLocks noGrp="1"/>
+          </p:cNvSpPr>
+          <p:nvPr>
+            <p:ph type="title"/>
+          </p:nvPr>
+        </p:nvSpPr>
+        <p:spPr/>
+        <p:txBody>
+          <a:bodyPr/>
+          <a:lstStyle/>
+          <a:p>
+            <a:r>
+              <a:rPr lang="en-US" dirty="0"/>
+              <a:t>Steak</a:t>
+            </a:r>
+          </a:p>
+        </p:txBody>
+      </p:sp>
+      <p:pic>
+        <p:nvPicPr>
+          <p:cNvPr id="5" name="Inhaltsplatzhalter 4">
+            <a:extLst>
+              <a:ext uri="{FF2B5EF4-FFF2-40B4-BE49-F238E27FC236}">
+                <a16:creationId xmlns:a16="http://schemas.microsoft.com/office/drawing/2014/main" id="{54B7B3E7-E1EF-4E63-B51B-2679B60E25AA}"/>
+              </a:ext>
+            </a:extLst>
+          </p:cNvPr>
+          <p:cNvPicPr>
+            <a:picLocks noGrp="1" noChangeAspect="1"/>
+          </p:cNvPicPr>
+          <p:nvPr>
+            <p:ph idx="1"/>
+          </p:nvPr>
+        </p:nvPicPr>
+        <p:blipFill>
+          <a:blip r:embed="rId2">
+            <a:extLst>
+              <a:ext uri="{28A0092B-C50C-407E-A947-70E740481C1C}">
+                <a14:useLocalDpi xmlns:a14="http://schemas.microsoft.com/office/drawing/2010/main" val="0"/>
+              </a:ext>
+            </a:extLst>
+          </a:blip>
+          <a:stretch>
+            <a:fillRect/>
+          </a:stretch>
+        </p:blipFill>
+        <p:spPr>
+          <a:xfrm>
+            <a:off x="636815" y="1690688"/>
+            <a:ext cx="4200327" cy="4351338"/>
+          </a:xfrm>
+        </p:spPr>
+      </p:pic>
+      <p:pic>
+        <p:nvPicPr>
+          <p:cNvPr id="7" name="Grafik 6">
+            <a:extLst>
+              <a:ext uri="{FF2B5EF4-FFF2-40B4-BE49-F238E27FC236}">
+                <a16:creationId xmlns:a16="http://schemas.microsoft.com/office/drawing/2014/main" id="{3F6B7B0D-A9FE-4992-9228-1271C872D8E4}"/>
+              </a:ext>
+            </a:extLst>
+          </p:cNvPr>
+          <p:cNvPicPr>
+            <a:picLocks noChangeAspect="1"/>
+          </p:cNvPicPr>
+          <p:nvPr/>
+        </p:nvPicPr>
+        <p:blipFill>
+          <a:blip r:embed="rId3">
+            <a:extLst>
+              <a:ext uri="{28A0092B-C50C-407E-A947-70E740481C1C}">
+                <a14:useLocalDpi xmlns:a14="http://schemas.microsoft.com/office/drawing/2010/main" val="0"/>
+              </a:ext>
+            </a:extLst>
+          </a:blip>
+          <a:stretch>
+            <a:fillRect/>
+          </a:stretch>
+        </p:blipFill>
+        <p:spPr>
+          <a:xfrm>
+            <a:off x="4623602" y="1690688"/>
+            <a:ext cx="3140587" cy="4440140"/>
+          </a:xfrm>
+          <a:prstGeom prst="rect">
+            <a:avLst/>
+          </a:prstGeom>
+        </p:spPr>
+      </p:pic>
+      <p:pic>
+        <p:nvPicPr>
+          <p:cNvPr id="9" name="Grafik 8" descr="Ein Bild, das weiß enthält.&#10;&#10;Automatisch generierte Beschreibung">
+            <a:extLst>
+              <a:ext uri="{FF2B5EF4-FFF2-40B4-BE49-F238E27FC236}">
+                <a16:creationId xmlns:a16="http://schemas.microsoft.com/office/drawing/2014/main" id="{B7072B2F-A808-442B-A7CA-4BDF713EA202}"/>
+              </a:ext>
+            </a:extLst>
+          </p:cNvPr>
+          <p:cNvPicPr>
+            <a:picLocks noChangeAspect="1"/>
+          </p:cNvPicPr>
+          <p:nvPr/>
+        </p:nvPicPr>
+        <p:blipFill>
+          <a:blip r:embed="rId4">
+            <a:extLst>
+              <a:ext uri="{28A0092B-C50C-407E-A947-70E740481C1C}">
+                <a14:useLocalDpi xmlns:a14="http://schemas.microsoft.com/office/drawing/2010/main" val="0"/>
+              </a:ext>
+            </a:extLst>
+          </a:blip>
+          <a:stretch>
+            <a:fillRect/>
+          </a:stretch>
+        </p:blipFill>
+        <p:spPr>
+          <a:xfrm>
+            <a:off x="7932808" y="1690688"/>
+            <a:ext cx="3616783" cy="4960343"/>
+          </a:xfrm>
+          <a:prstGeom prst="rect">
+            <a:avLst/>
+          </a:prstGeom>
+        </p:spPr>
+      </p:pic>
+    </p:spTree>
+    <p:extLst>
+      <p:ext uri="{BB962C8B-B14F-4D97-AF65-F5344CB8AC3E}">
+        <p14:creationId xmlns:p14="http://schemas.microsoft.com/office/powerpoint/2010/main" val="3130232117"/>
+      </p:ext>
+    </p:extLst>
+  </p:cSld>
+  <p:clrMapOvr>
+    <a:masterClrMapping/>
+  </p:clrMapOvr>
+</p:sld>
+</file>
+
+<file path=ppt/slides/slide16.xml><?xml version="1.0" encoding="utf-8"?>
+<p:sld xmlns:a="http://schemas.openxmlformats.org/drawingml/2006/main" xmlns:r="http://schemas.openxmlformats.org/officeDocument/2006/relationships" xmlns:p="http://schemas.openxmlformats.org/presentationml/2006/main">
+  <p:cSld>
+    <p:spTree>
+      <p:nvGrpSpPr>
+        <p:cNvPr id="1" name=""/>
+        <p:cNvGrpSpPr/>
+        <p:nvPr/>
+      </p:nvGrpSpPr>
+      <p:grpSpPr>
+        <a:xfrm>
+          <a:off x="0" y="0"/>
+          <a:ext cx="0" cy="0"/>
+          <a:chOff x="0" y="0"/>
+          <a:chExt cx="0" cy="0"/>
+        </a:xfrm>
+      </p:grpSpPr>
+      <p:sp>
+        <p:nvSpPr>
+          <p:cNvPr id="2" name="Titel 1">
+            <a:extLst>
+              <a:ext uri="{FF2B5EF4-FFF2-40B4-BE49-F238E27FC236}">
+                <a16:creationId xmlns:a16="http://schemas.microsoft.com/office/drawing/2014/main" id="{E5E92B10-1BB1-4CF8-8642-E5605291FF68}"/>
+              </a:ext>
+            </a:extLst>
+          </p:cNvPr>
+          <p:cNvSpPr>
+            <a:spLocks noGrp="1"/>
+          </p:cNvSpPr>
+          <p:nvPr>
+            <p:ph type="title"/>
+          </p:nvPr>
+        </p:nvSpPr>
+        <p:spPr/>
+        <p:txBody>
+          <a:bodyPr/>
+          <a:lstStyle/>
+          <a:p>
+            <a:r>
+              <a:rPr lang="en-US" dirty="0"/>
+              <a:t>Banana</a:t>
+            </a:r>
+          </a:p>
+        </p:txBody>
+      </p:sp>
+      <p:pic>
+        <p:nvPicPr>
+          <p:cNvPr id="5" name="Inhaltsplatzhalter 4" descr="Ein Bild, das Auto, groß, Personen, weiß enthält.&#10;&#10;Automatisch generierte Beschreibung">
+            <a:extLst>
+              <a:ext uri="{FF2B5EF4-FFF2-40B4-BE49-F238E27FC236}">
+                <a16:creationId xmlns:a16="http://schemas.microsoft.com/office/drawing/2014/main" id="{3DD3A901-0027-4172-9C37-9AE5540E2CD0}"/>
+              </a:ext>
+            </a:extLst>
+          </p:cNvPr>
+          <p:cNvPicPr>
+            <a:picLocks noGrp="1" noChangeAspect="1"/>
+          </p:cNvPicPr>
+          <p:nvPr>
+            <p:ph idx="1"/>
+          </p:nvPr>
+        </p:nvPicPr>
+        <p:blipFill>
+          <a:blip r:embed="rId2">
+            <a:extLst>
+              <a:ext uri="{28A0092B-C50C-407E-A947-70E740481C1C}">
+                <a14:useLocalDpi xmlns:a14="http://schemas.microsoft.com/office/drawing/2010/main" val="0"/>
+              </a:ext>
+            </a:extLst>
+          </a:blip>
+          <a:stretch>
+            <a:fillRect/>
+          </a:stretch>
+        </p:blipFill>
+        <p:spPr>
+          <a:xfrm>
+            <a:off x="838200" y="1956254"/>
+            <a:ext cx="3218411" cy="4351338"/>
+          </a:xfrm>
+        </p:spPr>
+      </p:pic>
+      <p:pic>
+        <p:nvPicPr>
+          <p:cNvPr id="7" name="Grafik 6" descr="Ein Bild, das Personen, Computer, weiß enthält.&#10;&#10;Automatisch generierte Beschreibung">
+            <a:extLst>
+              <a:ext uri="{FF2B5EF4-FFF2-40B4-BE49-F238E27FC236}">
+                <a16:creationId xmlns:a16="http://schemas.microsoft.com/office/drawing/2014/main" id="{E8EABCDD-A946-4511-A318-4E8F08D25963}"/>
+              </a:ext>
+            </a:extLst>
+          </p:cNvPr>
+          <p:cNvPicPr>
+            <a:picLocks noChangeAspect="1"/>
+          </p:cNvPicPr>
+          <p:nvPr/>
+        </p:nvPicPr>
+        <p:blipFill>
+          <a:blip r:embed="rId3">
+            <a:extLst>
+              <a:ext uri="{28A0092B-C50C-407E-A947-70E740481C1C}">
+                <a14:useLocalDpi xmlns:a14="http://schemas.microsoft.com/office/drawing/2010/main" val="0"/>
+              </a:ext>
+            </a:extLst>
+          </a:blip>
+          <a:stretch>
+            <a:fillRect/>
+          </a:stretch>
+        </p:blipFill>
+        <p:spPr>
+          <a:xfrm>
+            <a:off x="4098772" y="1829945"/>
+            <a:ext cx="3510582" cy="4916087"/>
+          </a:xfrm>
+          <a:prstGeom prst="rect">
+            <a:avLst/>
+          </a:prstGeom>
+        </p:spPr>
+      </p:pic>
+      <p:pic>
+        <p:nvPicPr>
+          <p:cNvPr id="9" name="Grafik 8" descr="Ein Bild, das Personen enthält.&#10;&#10;Automatisch generierte Beschreibung">
+            <a:extLst>
+              <a:ext uri="{FF2B5EF4-FFF2-40B4-BE49-F238E27FC236}">
+                <a16:creationId xmlns:a16="http://schemas.microsoft.com/office/drawing/2014/main" id="{F48964C5-25A6-4FD1-8752-B6F29BDDAB4D}"/>
+              </a:ext>
+            </a:extLst>
+          </p:cNvPr>
+          <p:cNvPicPr>
+            <a:picLocks noChangeAspect="1"/>
+          </p:cNvPicPr>
+          <p:nvPr/>
+        </p:nvPicPr>
+        <p:blipFill>
+          <a:blip r:embed="rId4">
+            <a:extLst>
+              <a:ext uri="{28A0092B-C50C-407E-A947-70E740481C1C}">
+                <a14:useLocalDpi xmlns:a14="http://schemas.microsoft.com/office/drawing/2010/main" val="0"/>
+              </a:ext>
+            </a:extLst>
+          </a:blip>
+          <a:stretch>
+            <a:fillRect/>
+          </a:stretch>
+        </p:blipFill>
+        <p:spPr>
+          <a:xfrm>
+            <a:off x="7806388" y="1702268"/>
+            <a:ext cx="3688926" cy="4903804"/>
+          </a:xfrm>
+          <a:prstGeom prst="rect">
+            <a:avLst/>
+          </a:prstGeom>
+        </p:spPr>
+      </p:pic>
+    </p:spTree>
+    <p:extLst>
+      <p:ext uri="{BB962C8B-B14F-4D97-AF65-F5344CB8AC3E}">
+        <p14:creationId xmlns:p14="http://schemas.microsoft.com/office/powerpoint/2010/main" val="3694157182"/>
+      </p:ext>
+    </p:extLst>
+  </p:cSld>
+  <p:clrMapOvr>
+    <a:masterClrMapping/>
+  </p:clrMapOvr>
+</p:sld>
+</file>
+
+<file path=ppt/slides/slide17.xml><?xml version="1.0" encoding="utf-8"?>
+<p:sld xmlns:a="http://schemas.openxmlformats.org/drawingml/2006/main" xmlns:r="http://schemas.openxmlformats.org/officeDocument/2006/relationships" xmlns:p="http://schemas.openxmlformats.org/presentationml/2006/main">
+  <p:cSld>
+    <p:spTree>
+      <p:nvGrpSpPr>
+        <p:cNvPr id="1" name=""/>
+        <p:cNvGrpSpPr/>
+        <p:nvPr/>
+      </p:nvGrpSpPr>
+      <p:grpSpPr>
+        <a:xfrm>
+          <a:off x="0" y="0"/>
+          <a:ext cx="0" cy="0"/>
+          <a:chOff x="0" y="0"/>
+          <a:chExt cx="0" cy="0"/>
+        </a:xfrm>
+      </p:grpSpPr>
+      <p:sp>
+        <p:nvSpPr>
+          <p:cNvPr id="2" name="Titel 1">
+            <a:extLst>
+              <a:ext uri="{FF2B5EF4-FFF2-40B4-BE49-F238E27FC236}">
+                <a16:creationId xmlns:a16="http://schemas.microsoft.com/office/drawing/2014/main" id="{D4D14D0E-1795-40BE-91B9-CBD758E95885}"/>
+              </a:ext>
+            </a:extLst>
+          </p:cNvPr>
+          <p:cNvSpPr>
+            <a:spLocks noGrp="1"/>
+          </p:cNvSpPr>
+          <p:nvPr>
+            <p:ph type="title"/>
+          </p:nvPr>
+        </p:nvSpPr>
+        <p:spPr/>
+        <p:txBody>
+          <a:bodyPr/>
+          <a:lstStyle/>
+          <a:p>
+            <a:r>
+              <a:rPr lang="en-US" dirty="0"/>
+              <a:t>Cake</a:t>
+            </a:r>
+          </a:p>
+        </p:txBody>
+      </p:sp>
+      <p:pic>
+        <p:nvPicPr>
+          <p:cNvPr id="5" name="Inhaltsplatzhalter 4" descr="Ein Bild, das draußen, Auto, groß, Personen enthält.&#10;&#10;Automatisch generierte Beschreibung">
+            <a:extLst>
+              <a:ext uri="{FF2B5EF4-FFF2-40B4-BE49-F238E27FC236}">
+                <a16:creationId xmlns:a16="http://schemas.microsoft.com/office/drawing/2014/main" id="{31273AEC-2BB6-4019-BFA1-6947A6258A48}"/>
+              </a:ext>
+            </a:extLst>
+          </p:cNvPr>
+          <p:cNvPicPr>
+            <a:picLocks noGrp="1" noChangeAspect="1"/>
+          </p:cNvPicPr>
+          <p:nvPr>
+            <p:ph idx="1"/>
+          </p:nvPr>
+        </p:nvPicPr>
+        <p:blipFill>
+          <a:blip r:embed="rId2">
+            <a:extLst>
+              <a:ext uri="{28A0092B-C50C-407E-A947-70E740481C1C}">
+                <a14:useLocalDpi xmlns:a14="http://schemas.microsoft.com/office/drawing/2010/main" val="0"/>
+              </a:ext>
+            </a:extLst>
+          </a:blip>
+          <a:stretch>
+            <a:fillRect/>
+          </a:stretch>
+        </p:blipFill>
+        <p:spPr>
+          <a:xfrm>
+            <a:off x="1055392" y="1946923"/>
+            <a:ext cx="3045936" cy="4351338"/>
+          </a:xfrm>
+        </p:spPr>
+      </p:pic>
+      <p:pic>
+        <p:nvPicPr>
+          <p:cNvPr id="7" name="Grafik 6">
+            <a:extLst>
+              <a:ext uri="{FF2B5EF4-FFF2-40B4-BE49-F238E27FC236}">
+                <a16:creationId xmlns:a16="http://schemas.microsoft.com/office/drawing/2014/main" id="{0205DEC2-74BC-4A9A-8F4C-4C0F83B1F786}"/>
+              </a:ext>
+            </a:extLst>
+          </p:cNvPr>
+          <p:cNvPicPr>
+            <a:picLocks noChangeAspect="1"/>
+          </p:cNvPicPr>
+          <p:nvPr/>
+        </p:nvPicPr>
+        <p:blipFill>
+          <a:blip r:embed="rId3">
+            <a:extLst>
+              <a:ext uri="{28A0092B-C50C-407E-A947-70E740481C1C}">
+                <a14:useLocalDpi xmlns:a14="http://schemas.microsoft.com/office/drawing/2010/main" val="0"/>
+              </a:ext>
+            </a:extLst>
+          </a:blip>
+          <a:stretch>
+            <a:fillRect/>
+          </a:stretch>
+        </p:blipFill>
+        <p:spPr>
+          <a:xfrm>
+            <a:off x="4391358" y="1988911"/>
+            <a:ext cx="3241083" cy="4695027"/>
+          </a:xfrm>
+          <a:prstGeom prst="rect">
+            <a:avLst/>
+          </a:prstGeom>
+        </p:spPr>
+      </p:pic>
+      <p:pic>
+        <p:nvPicPr>
+          <p:cNvPr id="9" name="Grafik 8" descr="Ein Bild, das Auto, Personen, groß, weiß enthält.&#10;&#10;Automatisch generierte Beschreibung">
+            <a:extLst>
+              <a:ext uri="{FF2B5EF4-FFF2-40B4-BE49-F238E27FC236}">
+                <a16:creationId xmlns:a16="http://schemas.microsoft.com/office/drawing/2014/main" id="{AA4D75CE-ADA0-4CCB-BAF3-E33D54FCDDB8}"/>
+              </a:ext>
+            </a:extLst>
+          </p:cNvPr>
+          <p:cNvPicPr>
+            <a:picLocks noChangeAspect="1"/>
+          </p:cNvPicPr>
+          <p:nvPr/>
+        </p:nvPicPr>
+        <p:blipFill>
+          <a:blip r:embed="rId4">
+            <a:extLst>
+              <a:ext uri="{28A0092B-C50C-407E-A947-70E740481C1C}">
+                <a14:useLocalDpi xmlns:a14="http://schemas.microsoft.com/office/drawing/2010/main" val="0"/>
+              </a:ext>
+            </a:extLst>
+          </a:blip>
+          <a:stretch>
+            <a:fillRect/>
+          </a:stretch>
+        </p:blipFill>
+        <p:spPr>
+          <a:xfrm>
+            <a:off x="8873288" y="2174033"/>
+            <a:ext cx="3318712" cy="4609322"/>
+          </a:xfrm>
+          <a:prstGeom prst="rect">
+            <a:avLst/>
+          </a:prstGeom>
+        </p:spPr>
+      </p:pic>
+    </p:spTree>
+    <p:extLst>
+      <p:ext uri="{BB962C8B-B14F-4D97-AF65-F5344CB8AC3E}">
+        <p14:creationId xmlns:p14="http://schemas.microsoft.com/office/powerpoint/2010/main" val="3231806013"/>
+      </p:ext>
+    </p:extLst>
+  </p:cSld>
+  <p:clrMapOvr>
+    <a:masterClrMapping/>
+  </p:clrMapOvr>
+</p:sld>
+</file>
+
+<file path=ppt/slides/slide18.xml><?xml version="1.0" encoding="utf-8"?>
+<p:sld xmlns:a="http://schemas.openxmlformats.org/drawingml/2006/main" xmlns:r="http://schemas.openxmlformats.org/officeDocument/2006/relationships" xmlns:p="http://schemas.openxmlformats.org/presentationml/2006/main">
+  <p:cSld>
+    <p:spTree>
+      <p:nvGrpSpPr>
+        <p:cNvPr id="1" name=""/>
+        <p:cNvGrpSpPr/>
+        <p:nvPr/>
+      </p:nvGrpSpPr>
+      <p:grpSpPr>
+        <a:xfrm>
+          <a:off x="0" y="0"/>
+          <a:ext cx="0" cy="0"/>
+          <a:chOff x="0" y="0"/>
+          <a:chExt cx="0" cy="0"/>
+        </a:xfrm>
+      </p:grpSpPr>
+      <p:sp>
+        <p:nvSpPr>
+          <p:cNvPr id="2" name="Titel 1">
+            <a:extLst>
+              <a:ext uri="{FF2B5EF4-FFF2-40B4-BE49-F238E27FC236}">
+                <a16:creationId xmlns:a16="http://schemas.microsoft.com/office/drawing/2014/main" id="{72F3922A-3C6A-4116-A91A-4E7155D51914}"/>
+              </a:ext>
+            </a:extLst>
+          </p:cNvPr>
+          <p:cNvSpPr>
+            <a:spLocks noGrp="1"/>
+          </p:cNvSpPr>
+          <p:nvPr>
+            <p:ph type="title"/>
+          </p:nvPr>
+        </p:nvSpPr>
+        <p:spPr/>
+        <p:txBody>
+          <a:bodyPr/>
+          <a:lstStyle/>
+          <a:p>
+            <a:r>
+              <a:rPr lang="en-US" dirty="0"/>
+              <a:t>Conclusion</a:t>
+            </a:r>
+          </a:p>
+        </p:txBody>
+      </p:sp>
+      <p:sp>
+        <p:nvSpPr>
+          <p:cNvPr id="3" name="Inhaltsplatzhalter 2">
+            <a:extLst>
+              <a:ext uri="{FF2B5EF4-FFF2-40B4-BE49-F238E27FC236}">
+                <a16:creationId xmlns:a16="http://schemas.microsoft.com/office/drawing/2014/main" id="{EA5A7515-A04D-430E-AF96-D8576ABE6162}"/>
+              </a:ext>
+            </a:extLst>
+          </p:cNvPr>
+          <p:cNvSpPr>
+            <a:spLocks noGrp="1"/>
+          </p:cNvSpPr>
+          <p:nvPr>
+            <p:ph idx="1"/>
+          </p:nvPr>
+        </p:nvSpPr>
+        <p:spPr/>
+        <p:txBody>
+          <a:bodyPr/>
+          <a:lstStyle/>
+          <a:p>
+            <a:r>
+              <a:rPr lang="en-US" dirty="0"/>
+              <a:t>Automatically generating Antonym pairs lead to very general pairs which are not sufficient to describe the words from specific categories sufficiently</a:t>
+            </a:r>
+          </a:p>
+        </p:txBody>
+      </p:sp>
+    </p:spTree>
+    <p:extLst>
+      <p:ext uri="{BB962C8B-B14F-4D97-AF65-F5344CB8AC3E}">
+        <p14:creationId xmlns:p14="http://schemas.microsoft.com/office/powerpoint/2010/main" val="1543081269"/>
+      </p:ext>
+    </p:extLst>
+  </p:cSld>
+  <p:clrMapOvr>
+    <a:masterClrMapping/>
+  </p:clrMapOvr>
+</p:sld>
+</file>
+
+<file path=ppt/slides/slide19.xml><?xml version="1.0" encoding="utf-8"?>
+<p:sld xmlns:a="http://schemas.openxmlformats.org/drawingml/2006/main" xmlns:r="http://schemas.openxmlformats.org/officeDocument/2006/relationships" xmlns:p="http://schemas.openxmlformats.org/presentationml/2006/main">
+  <p:cSld>
+    <p:spTree>
+      <p:nvGrpSpPr>
+        <p:cNvPr id="1" name=""/>
+        <p:cNvGrpSpPr/>
+        <p:nvPr/>
+      </p:nvGrpSpPr>
+      <p:grpSpPr>
+        <a:xfrm>
+          <a:off x="0" y="0"/>
+          <a:ext cx="0" cy="0"/>
+          <a:chOff x="0" y="0"/>
+          <a:chExt cx="0" cy="0"/>
+        </a:xfrm>
+      </p:grpSpPr>
+      <p:sp>
+        <p:nvSpPr>
+          <p:cNvPr id="2" name="Titel 1">
+            <a:extLst>
+              <a:ext uri="{FF2B5EF4-FFF2-40B4-BE49-F238E27FC236}">
+                <a16:creationId xmlns:a16="http://schemas.microsoft.com/office/drawing/2014/main" id="{774ACF3E-D262-489E-898A-DEEDDB1C4DA2}"/>
+              </a:ext>
+            </a:extLst>
+          </p:cNvPr>
+          <p:cNvSpPr>
+            <a:spLocks noGrp="1"/>
+          </p:cNvSpPr>
+          <p:nvPr>
+            <p:ph type="title"/>
+          </p:nvPr>
+        </p:nvSpPr>
+        <p:spPr/>
+        <p:txBody>
+          <a:bodyPr/>
+          <a:lstStyle/>
+          <a:p>
+            <a:endParaRPr lang="en-US"/>
+          </a:p>
+        </p:txBody>
+      </p:sp>
+      <p:sp>
+        <p:nvSpPr>
+          <p:cNvPr id="3" name="Inhaltsplatzhalter 2">
+            <a:extLst>
+              <a:ext uri="{FF2B5EF4-FFF2-40B4-BE49-F238E27FC236}">
+                <a16:creationId xmlns:a16="http://schemas.microsoft.com/office/drawing/2014/main" id="{7FF7FB95-DFE5-4D76-AB8C-3C056F03CCA1}"/>
+              </a:ext>
+            </a:extLst>
+          </p:cNvPr>
+          <p:cNvSpPr>
+            <a:spLocks noGrp="1"/>
+          </p:cNvSpPr>
+          <p:nvPr>
+            <p:ph idx="1"/>
+          </p:nvPr>
+        </p:nvSpPr>
+        <p:spPr/>
+        <p:txBody>
+          <a:bodyPr/>
+          <a:lstStyle/>
+          <a:p>
+            <a:r>
+              <a:rPr lang="en-US" dirty="0"/>
+              <a:t>While in our explanations we only use antonyms, polar opposites could also include other terms, such as political terms representing politically opposite ideologies (e.g. republican vs. democrat) that could be obtained from political experts, or people representing opposite views (e.g. Chomsky vs. </a:t>
+            </a:r>
+            <a:r>
+              <a:rPr lang="en-US" dirty="0" err="1"/>
+              <a:t>Norvig</a:t>
+            </a:r>
+            <a:r>
+              <a:rPr lang="en-US" dirty="0"/>
+              <a:t>) that could be obtained from domain experts. </a:t>
+            </a:r>
+          </a:p>
+          <a:p>
+            <a:endParaRPr lang="en-US" dirty="0"/>
+          </a:p>
+        </p:txBody>
+      </p:sp>
+    </p:spTree>
+    <p:extLst>
+      <p:ext uri="{BB962C8B-B14F-4D97-AF65-F5344CB8AC3E}">
+        <p14:creationId xmlns:p14="http://schemas.microsoft.com/office/powerpoint/2010/main" val="3456876042"/>
+      </p:ext>
+    </p:extLst>
+  </p:cSld>
+  <p:clrMapOvr>
+    <a:masterClrMapping/>
+  </p:clrMapOvr>
+</p:sld>
+</file>
+
 <file path=ppt/slides/slide2.xml><?xml version="1.0" encoding="utf-8"?>
 <p:sld xmlns:a="http://schemas.openxmlformats.org/drawingml/2006/main" xmlns:r="http://schemas.openxmlformats.org/officeDocument/2006/relationships" xmlns:p="http://schemas.openxmlformats.org/presentationml/2006/main">
   <p:cSld>
@@ -3507,15 +4963,7 @@
             </a:pPr>
             <a:r>
               <a:rPr lang="en-US" dirty="0"/>
-              <a:t>Search Wikipedia for entries out of the category (e.g. </a:t>
-            </a:r>
-            <a:r>
-              <a:rPr lang="en-US" dirty="0" err="1"/>
-              <a:t>germany</a:t>
-            </a:r>
-            <a:r>
-              <a:rPr lang="en-US" dirty="0"/>
-              <a:t>)</a:t>
+              <a:t>Search Wikipedia for entries from this category (e.g. Germany)</a:t>
             </a:r>
           </a:p>
           <a:p>
@@ -3525,7 +4973,7 @@
             </a:pPr>
             <a:r>
               <a:rPr lang="en-US" dirty="0"/>
-              <a:t>Retrieve Wikipedia article from entry</a:t>
+              <a:t>Retrieve Wikipedia articles</a:t>
             </a:r>
           </a:p>
           <a:p>
@@ -3616,7 +5064,12 @@
             <p:ph type="title"/>
           </p:nvPr>
         </p:nvSpPr>
-        <p:spPr/>
+        <p:spPr>
+          <a:xfrm>
+            <a:off x="838200" y="36918"/>
+            <a:ext cx="10515600" cy="1325563"/>
+          </a:xfrm>
+        </p:spPr>
         <p:txBody>
           <a:bodyPr/>
           <a:lstStyle/>
@@ -3644,258 +5097,212 @@
             <p:ph idx="1"/>
           </p:nvPr>
         </p:nvSpPr>
-        <p:spPr/>
+        <p:spPr>
+          <a:xfrm>
+            <a:off x="838200" y="1241571"/>
+            <a:ext cx="10515600" cy="4935392"/>
+          </a:xfrm>
+        </p:spPr>
         <p:txBody>
           <a:bodyPr>
-            <a:normAutofit fontScale="47500" lnSpcReduction="20000"/>
+            <a:normAutofit fontScale="92500" lnSpcReduction="20000"/>
           </a:bodyPr>
           <a:lstStyle/>
           <a:p>
             <a:r>
-              <a:rPr lang="en-US" sz="4500" dirty="0"/>
-              <a:t>Used Wikipedia pages of Countries with biggest GDP (e.g. USA, China, Japan, Germany…)</a:t>
-            </a:r>
-          </a:p>
-          <a:p>
-            <a:r>
-              <a:rPr lang="en-US" sz="4500" dirty="0"/>
+              <a:rPr lang="en-US" sz="2400" dirty="0"/>
+              <a:t>Used Wikipedia pages of Countries with biggest GDP</a:t>
+            </a:r>
+          </a:p>
+          <a:p>
+            <a:r>
+              <a:rPr lang="en-US" sz="2400" dirty="0"/>
+              <a:t>United States ,China, Japan, Germany, United Kingdom, France, India, Italy, Canada, Russia</a:t>
+            </a:r>
+          </a:p>
+          <a:p>
+            <a:r>
+              <a:rPr lang="en-US" sz="2400" dirty="0"/>
               <a:t>Generated Antonym pairs:  1677 (adding more countries didn’t increase this Number too much)</a:t>
             </a:r>
           </a:p>
           <a:p>
             <a:r>
-              <a:rPr lang="en-US" sz="4500" dirty="0"/>
+              <a:rPr lang="en-US" sz="2400" dirty="0"/>
               <a:t>Applied Polar with 300 Dimensions</a:t>
             </a:r>
           </a:p>
           <a:p>
             <a:r>
-              <a:rPr lang="en-US" sz="4500" dirty="0"/>
+              <a:rPr lang="en-US" sz="2400" dirty="0"/>
               <a:t>First observation: </a:t>
             </a:r>
             <a:r>
-              <a:rPr lang="en-US" sz="4500" b="1" dirty="0"/>
+              <a:rPr lang="en-US" sz="2400" b="1" dirty="0"/>
               <a:t>Most</a:t>
             </a:r>
             <a:r>
-              <a:rPr lang="en-US" sz="4500" dirty="0"/>
+              <a:rPr lang="en-US" sz="2400" dirty="0"/>
               <a:t> generated antonyms are very general and non-expressive for the category, e.g.</a:t>
             </a:r>
           </a:p>
           <a:p>
             <a:r>
-              <a:rPr lang="en-US" altLang="en-US" sz="4500" dirty="0">
+              <a:rPr lang="en-US" altLang="en-US" sz="2400" dirty="0">
                 <a:solidFill>
                   <a:srgbClr val="000000"/>
                 </a:solidFill>
                 <a:latin typeface="Arial Unicode MS"/>
                 <a:ea typeface="Courier New" panose="02070309020205020404" pitchFamily="49" charset="0"/>
               </a:rPr>
-              <a:t>('known', 'unknown'), ('equal', 'differ'), ('central', 'peripheral'), </a:t>
-            </a:r>
-            <a:r>
-              <a:rPr lang="en-US" altLang="en-US" sz="4500" dirty="0">
-                <a:solidFill>
-                  <a:srgbClr val="FF0000"/>
+              <a:t>('known', 'unknown'), ('equal', 'differ'), ('central', 'peripheral'),('major', 'minor'), ('square', 'round'), ('straight', 'crooked'), ('most', 'fewest'), ('most', 'least'), (</a:t>
+            </a:r>
+            <a:r>
+              <a:rPr lang="en-US" altLang="en-US" sz="2400" i="1" dirty="0">
+                <a:solidFill>
+                  <a:srgbClr val="000000"/>
                 </a:solidFill>
                 <a:latin typeface="Arial Unicode MS"/>
                 <a:ea typeface="Courier New" panose="02070309020205020404" pitchFamily="49" charset="0"/>
               </a:rPr>
-              <a:t>('north', 'south')</a:t>
-            </a:r>
-            <a:r>
-              <a:rPr lang="en-US" altLang="en-US" sz="4500" dirty="0">
+              <a:t>'uppercase</a:t>
+            </a:r>
+            <a:r>
+              <a:rPr lang="en-US" altLang="en-US" sz="2400" dirty="0">
                 <a:solidFill>
                   <a:srgbClr val="000000"/>
                 </a:solidFill>
                 <a:latin typeface="Arial Unicode MS"/>
                 <a:ea typeface="Courier New" panose="02070309020205020404" pitchFamily="49" charset="0"/>
               </a:rPr>
-              <a:t>, </a:t>
-            </a:r>
-            <a:r>
-              <a:rPr lang="en-US" altLang="en-US" sz="4500" dirty="0">
-                <a:solidFill>
-                  <a:srgbClr val="FF0000"/>
-                </a:solidFill>
+              <a:t>', 'lowercase'), ('new', 'old'), ('new', 'worn'), ('least', 'most’) ('notice', 'ignore'), ('marked', 'unmarked'), ('worsen', 'better'), ('refuse', 'accept'), </a:t>
+            </a:r>
+          </a:p>
+          <a:p>
+            <a:r>
+              <a:rPr lang="en-US" altLang="en-US" sz="2400" dirty="0">
+                <a:latin typeface="Arial Unicode MS"/>
+              </a:rPr>
+              <a:t>However, </a:t>
+            </a:r>
+            <a:r>
+              <a:rPr lang="en-US" altLang="en-US" sz="2400" i="1" dirty="0">
+                <a:latin typeface="Arial Unicode MS"/>
+              </a:rPr>
+              <a:t>some</a:t>
+            </a:r>
+            <a:r>
+              <a:rPr lang="en-US" altLang="en-US" sz="2400" dirty="0">
+                <a:latin typeface="Arial Unicode MS"/>
+              </a:rPr>
+              <a:t> interesting ones:</a:t>
+            </a:r>
+          </a:p>
+          <a:p>
+            <a:r>
+              <a:rPr lang="en-US" altLang="en-US" sz="2400" dirty="0">
                 <a:latin typeface="Arial Unicode MS"/>
                 <a:ea typeface="Courier New" panose="02070309020205020404" pitchFamily="49" charset="0"/>
               </a:rPr>
-              <a:t>('federal', 'unitary')</a:t>
-            </a:r>
-            <a:r>
-              <a:rPr lang="en-US" altLang="en-US" sz="4500" dirty="0">
-                <a:solidFill>
-                  <a:srgbClr val="000000"/>
-                </a:solidFill>
+              <a:t>('north', 'south’), ('urban', 'rural'),</a:t>
+            </a:r>
+            <a:r>
+              <a:rPr lang="en-US" altLang="en-US" sz="2400" dirty="0"/>
+              <a:t> </a:t>
+            </a:r>
+            <a:r>
+              <a:rPr lang="en-US" altLang="en-US" sz="2400" dirty="0">
                 <a:latin typeface="Arial Unicode MS"/>
                 <a:ea typeface="Courier New" panose="02070309020205020404" pitchFamily="49" charset="0"/>
               </a:rPr>
-              <a:t>, ('major', 'minor'), ('square', 'round'), ('straight', 'crooked'), ('most', 'fewest'), ('most', 'least'), ('uppercase', 'lowercase'), ('new', 'old'), ('new', 'worn'), ('least', 'most’) ('notice', 'ignore'), ('marked', 'unmarked'), ('worsen', 'better'), ('refuse', 'accept'), </a:t>
-            </a:r>
-            <a:r>
-              <a:rPr lang="en-US" altLang="en-US" sz="4500" dirty="0">
-                <a:solidFill>
-                  <a:srgbClr val="FF0000"/>
-                </a:solidFill>
+              <a:t>('military', 'civilian'),</a:t>
+            </a:r>
+            <a:r>
+              <a:rPr lang="en-US" altLang="en-US" sz="2400" dirty="0"/>
+              <a:t> </a:t>
+            </a:r>
+            <a:r>
+              <a:rPr lang="en-US" altLang="en-US" sz="2400" dirty="0">
                 <a:latin typeface="Arial Unicode MS"/>
                 <a:ea typeface="Courier New" panose="02070309020205020404" pitchFamily="49" charset="0"/>
               </a:rPr>
-              <a:t>('export', 'import')</a:t>
-            </a:r>
-            <a:endParaRPr lang="en-US" altLang="en-US" sz="4500" dirty="0">
-              <a:solidFill>
-                <a:srgbClr val="000000"/>
-              </a:solidFill>
-              <a:latin typeface="Arial Unicode MS"/>
-              <a:ea typeface="Courier New" panose="02070309020205020404" pitchFamily="49" charset="0"/>
-            </a:endParaRPr>
-          </a:p>
-          <a:p>
-            <a:r>
-              <a:rPr lang="en-US" altLang="en-US" sz="4500" dirty="0">
-                <a:solidFill>
-                  <a:srgbClr val="000000"/>
-                </a:solidFill>
-                <a:latin typeface="Arial Unicode MS"/>
-              </a:rPr>
-              <a:t>However, some </a:t>
-            </a:r>
-            <a:r>
-              <a:rPr lang="en-US" altLang="en-US" sz="4500" dirty="0">
-                <a:solidFill>
-                  <a:srgbClr val="FF0000"/>
-                </a:solidFill>
-                <a:latin typeface="Arial Unicode MS"/>
-              </a:rPr>
-              <a:t>interesting</a:t>
-            </a:r>
-            <a:r>
-              <a:rPr lang="en-US" altLang="en-US" sz="4500" dirty="0">
-                <a:solidFill>
-                  <a:srgbClr val="000000"/>
-                </a:solidFill>
-                <a:latin typeface="Arial Unicode MS"/>
-              </a:rPr>
-              <a:t> ones:</a:t>
-            </a:r>
-          </a:p>
-          <a:p>
-            <a:r>
-              <a:rPr lang="en-US" altLang="en-US" sz="4500" dirty="0">
-                <a:solidFill>
-                  <a:srgbClr val="000000"/>
-                </a:solidFill>
+              <a:t>('nuclear', 'conventional'),</a:t>
+            </a:r>
+            <a:r>
+              <a:rPr lang="en-US" altLang="en-US" sz="2400" dirty="0"/>
+              <a:t> </a:t>
+            </a:r>
+            <a:r>
+              <a:rPr lang="en-US" altLang="en-US" sz="2400" dirty="0">
                 <a:latin typeface="Arial Unicode MS"/>
                 <a:ea typeface="Courier New" panose="02070309020205020404" pitchFamily="49" charset="0"/>
               </a:rPr>
-              <a:t>('urban', 'rural'),</a:t>
-            </a:r>
-            <a:r>
-              <a:rPr lang="en-US" altLang="en-US" sz="4500" dirty="0"/>
+              <a:t>('nuclear', 'conventional'),</a:t>
+            </a:r>
+            <a:r>
+              <a:rPr lang="en-US" altLang="en-US" sz="2400" dirty="0"/>
               <a:t> </a:t>
             </a:r>
             <a:r>
-              <a:rPr lang="en-US" altLang="en-US" sz="4500" dirty="0">
-                <a:solidFill>
-                  <a:srgbClr val="000000"/>
-                </a:solidFill>
+              <a:rPr lang="en-US" altLang="en-US" sz="2400" dirty="0">
                 <a:latin typeface="Arial Unicode MS"/>
                 <a:ea typeface="Courier New" panose="02070309020205020404" pitchFamily="49" charset="0"/>
               </a:rPr>
-              <a:t>('military', 'civilian'),</a:t>
-            </a:r>
-            <a:r>
-              <a:rPr lang="en-US" altLang="en-US" sz="4500" dirty="0"/>
+              <a:t>('civil', 'uncivil'),</a:t>
+            </a:r>
+            <a:r>
+              <a:rPr lang="en-US" altLang="en-US" sz="2400" dirty="0"/>
               <a:t> </a:t>
             </a:r>
             <a:r>
-              <a:rPr lang="en-US" altLang="en-US" sz="4500" dirty="0">
-                <a:solidFill>
-                  <a:srgbClr val="000000"/>
-                </a:solidFill>
+              <a:rPr lang="en-US" altLang="en-US" sz="2400" dirty="0">
                 <a:latin typeface="Arial Unicode MS"/>
                 <a:ea typeface="Courier New" panose="02070309020205020404" pitchFamily="49" charset="0"/>
               </a:rPr>
-              <a:t>('nuclear', 'conventional'),</a:t>
-            </a:r>
-            <a:r>
-              <a:rPr lang="en-US" altLang="en-US" sz="4500" dirty="0"/>
+              <a:t>('war', 'peace'),</a:t>
+            </a:r>
+            <a:r>
+              <a:rPr lang="en-US" altLang="en-US" sz="2400" dirty="0"/>
               <a:t> </a:t>
             </a:r>
             <a:r>
-              <a:rPr lang="en-US" altLang="en-US" sz="4500" dirty="0">
-                <a:solidFill>
-                  <a:srgbClr val="000000"/>
-                </a:solidFill>
+              <a:rPr lang="en-US" altLang="en-US" sz="2400" dirty="0">
                 <a:latin typeface="Arial Unicode MS"/>
                 <a:ea typeface="Courier New" panose="02070309020205020404" pitchFamily="49" charset="0"/>
               </a:rPr>
-              <a:t>('nuclear', 'conventional'),</a:t>
-            </a:r>
-            <a:r>
-              <a:rPr lang="en-US" altLang="en-US" sz="4500" dirty="0"/>
-              <a:t> </a:t>
-            </a:r>
-            <a:r>
-              <a:rPr lang="en-US" altLang="en-US" sz="4500" dirty="0">
-                <a:solidFill>
-                  <a:srgbClr val="000000"/>
-                </a:solidFill>
-                <a:latin typeface="Arial Unicode MS"/>
-                <a:ea typeface="Courier New" panose="02070309020205020404" pitchFamily="49" charset="0"/>
-              </a:rPr>
-              <a:t>('civil', 'uncivil'),</a:t>
-            </a:r>
-            <a:r>
-              <a:rPr lang="en-US" altLang="en-US" sz="4500" dirty="0"/>
-              <a:t> </a:t>
-            </a:r>
-            <a:r>
-              <a:rPr lang="en-US" altLang="en-US" sz="4500" dirty="0">
-                <a:solidFill>
-                  <a:srgbClr val="000000"/>
-                </a:solidFill>
-                <a:latin typeface="Arial Unicode MS"/>
-                <a:ea typeface="Courier New" panose="02070309020205020404" pitchFamily="49" charset="0"/>
-              </a:rPr>
-              <a:t>('war', 'peace'),</a:t>
-            </a:r>
-            <a:r>
-              <a:rPr lang="en-US" altLang="en-US" sz="4500" dirty="0"/>
-              <a:t> </a:t>
-            </a:r>
-            <a:endParaRPr lang="en-US" altLang="en-US" sz="4500" dirty="0">
+              <a:t>('export', 'import')</a:t>
+            </a:r>
+            <a:endParaRPr lang="en-US" altLang="en-US" sz="2400" dirty="0">
               <a:latin typeface="Arial" panose="020B0604020202020204" pitchFamily="34" charset="0"/>
             </a:endParaRPr>
           </a:p>
           <a:p>
-            <a:endParaRPr lang="en-US" altLang="en-US" sz="9600" dirty="0">
+            <a:endParaRPr lang="en-US" altLang="en-US" sz="4800" dirty="0">
               <a:latin typeface="Arial" panose="020B0604020202020204" pitchFamily="34" charset="0"/>
             </a:endParaRPr>
           </a:p>
           <a:p>
-            <a:endParaRPr lang="en-US" altLang="en-US" sz="9600" dirty="0">
+            <a:endParaRPr lang="en-US" altLang="en-US" sz="4800" dirty="0">
               <a:latin typeface="Arial" panose="020B0604020202020204" pitchFamily="34" charset="0"/>
             </a:endParaRPr>
           </a:p>
           <a:p>
-            <a:endParaRPr lang="en-US" altLang="en-US" sz="9600" dirty="0">
+            <a:endParaRPr lang="en-US" altLang="en-US" sz="4800" dirty="0">
               <a:latin typeface="Arial" panose="020B0604020202020204" pitchFamily="34" charset="0"/>
             </a:endParaRPr>
           </a:p>
           <a:p>
-            <a:endParaRPr lang="en-US" altLang="en-US" sz="8000" dirty="0">
+            <a:endParaRPr lang="en-US" altLang="en-US" sz="4000" dirty="0">
               <a:latin typeface="Arial" panose="020B0604020202020204" pitchFamily="34" charset="0"/>
             </a:endParaRPr>
           </a:p>
           <a:p>
-            <a:endParaRPr lang="en-US" altLang="en-US" sz="4400" dirty="0">
+            <a:endParaRPr lang="en-US" altLang="en-US" sz="2400" dirty="0">
               <a:latin typeface="Arial" panose="020B0604020202020204" pitchFamily="34" charset="0"/>
             </a:endParaRPr>
           </a:p>
           <a:p>
-            <a:endParaRPr lang="en-US" altLang="en-US" sz="2000" dirty="0">
+            <a:endParaRPr lang="en-US" altLang="en-US" sz="1100" dirty="0">
               <a:solidFill>
                 <a:srgbClr val="000000"/>
               </a:solidFill>
@@ -3903,15 +5310,15 @@
             </a:endParaRPr>
           </a:p>
           <a:p>
-            <a:endParaRPr lang="en-US" altLang="en-US" sz="2000" dirty="0"/>
-          </a:p>
-          <a:p>
-            <a:endParaRPr lang="en-US" altLang="en-US" sz="5400" dirty="0">
+            <a:endParaRPr lang="en-US" altLang="en-US" sz="1100" dirty="0"/>
+          </a:p>
+          <a:p>
+            <a:endParaRPr lang="en-US" altLang="en-US" dirty="0">
               <a:latin typeface="Arial" panose="020B0604020202020204" pitchFamily="34" charset="0"/>
             </a:endParaRPr>
           </a:p>
           <a:p>
-            <a:endParaRPr lang="en-US" dirty="0"/>
+            <a:endParaRPr lang="en-US" sz="1400" dirty="0"/>
           </a:p>
         </p:txBody>
       </p:sp>
@@ -4893,8 +6300,8 @@
         </p:nvSpPr>
         <p:spPr bwMode="auto">
           <a:xfrm>
-            <a:off x="196554" y="2754799"/>
-            <a:ext cx="10630967" cy="2492990"/>
+            <a:off x="196554" y="2308524"/>
+            <a:ext cx="10630967" cy="3385542"/>
           </a:xfrm>
           <a:prstGeom prst="rect">
             <a:avLst/>
@@ -4954,161 +6361,229 @@
               <a:tabLst/>
             </a:pPr>
             <a:r>
-              <a:rPr kumimoji="0" lang="en-US" altLang="en-US" sz="1800" b="0" i="0" u="none" strike="noStrike" cap="none" normalizeH="0" baseline="0" dirty="0">
+              <a:rPr lang="en-US" altLang="en-US" sz="2000" dirty="0">
+                <a:latin typeface="Arial Unicode MS"/>
+                <a:ea typeface="Courier New" panose="02070309020205020404" pitchFamily="49" charset="0"/>
+              </a:rPr>
+              <a:t>We marked in </a:t>
+            </a:r>
+            <a:r>
+              <a:rPr lang="en-US" altLang="en-US" sz="2000" dirty="0">
+                <a:solidFill>
+                  <a:srgbClr val="FF0000"/>
+                </a:solidFill>
+                <a:latin typeface="Arial Unicode MS"/>
+                <a:ea typeface="Courier New" panose="02070309020205020404" pitchFamily="49" charset="0"/>
+              </a:rPr>
+              <a:t>red</a:t>
+            </a:r>
+            <a:r>
+              <a:rPr lang="en-US" altLang="en-US" sz="2000" dirty="0">
+                <a:latin typeface="Arial Unicode MS"/>
+                <a:ea typeface="Courier New" panose="02070309020205020404" pitchFamily="49" charset="0"/>
+              </a:rPr>
+              <a:t> the pairs we think are interesting:</a:t>
+            </a:r>
+          </a:p>
+          <a:p>
+            <a:pPr marL="0" marR="0" lvl="0" indent="0" algn="l" defTabSz="914400" rtl="0" eaLnBrk="0" fontAlgn="base" latinLnBrk="0" hangingPunct="0">
+              <a:lnSpc>
+                <a:spcPct val="100000"/>
+              </a:lnSpc>
+              <a:spcBef>
+                <a:spcPct val="0"/>
+              </a:spcBef>
+              <a:spcAft>
+                <a:spcPct val="0"/>
+              </a:spcAft>
+              <a:buClrTx/>
+              <a:buSzTx/>
+              <a:buFontTx/>
+              <a:buNone/>
+              <a:tabLst/>
+            </a:pPr>
+            <a:endParaRPr kumimoji="0" lang="en-US" altLang="en-US" sz="2000" b="1" i="0" u="none" strike="noStrike" cap="none" normalizeH="0" baseline="0" dirty="0">
+              <a:ln>
+                <a:noFill/>
+              </a:ln>
+              <a:effectLst/>
+              <a:latin typeface="Arial Unicode MS"/>
+              <a:ea typeface="Courier New" panose="02070309020205020404" pitchFamily="49" charset="0"/>
+            </a:endParaRPr>
+          </a:p>
+          <a:p>
+            <a:pPr marL="0" marR="0" lvl="0" indent="0" algn="l" defTabSz="914400" rtl="0" eaLnBrk="0" fontAlgn="base" latinLnBrk="0" hangingPunct="0">
+              <a:lnSpc>
+                <a:spcPct val="100000"/>
+              </a:lnSpc>
+              <a:spcBef>
+                <a:spcPct val="0"/>
+              </a:spcBef>
+              <a:spcAft>
+                <a:spcPct val="0"/>
+              </a:spcAft>
+              <a:buClrTx/>
+              <a:buSzTx/>
+              <a:buFontTx/>
+              <a:buNone/>
+              <a:tabLst/>
+            </a:pPr>
+            <a:r>
+              <a:rPr kumimoji="0" lang="en-US" altLang="en-US" sz="2000" b="0" i="0" u="none" strike="noStrike" cap="none" normalizeH="0" baseline="0" dirty="0">
                 <a:ln>
                   <a:noFill/>
                 </a:ln>
                 <a:solidFill>
-                  <a:srgbClr val="000000"/>
+                  <a:srgbClr val="FF0000"/>
                 </a:solidFill>
                 <a:effectLst/>
                 <a:latin typeface="Arial Unicode MS"/>
                 <a:ea typeface="Courier New" panose="02070309020205020404" pitchFamily="49" charset="0"/>
               </a:rPr>
-              <a:t>('popular', 'unpopular'), </a:t>
-            </a:r>
-            <a:r>
-              <a:rPr kumimoji="0" lang="en-US" altLang="en-US" sz="1800" b="0" i="0" u="none" strike="noStrike" cap="none" normalizeH="0" baseline="0" dirty="0">
+              <a:t>('popular', 'unpopular'), ('like', 'dislike')</a:t>
+            </a:r>
+            <a:r>
+              <a:rPr kumimoji="0" lang="en-US" altLang="en-US" sz="2000" b="0" i="0" u="none" strike="noStrike" cap="none" normalizeH="0" baseline="0" dirty="0">
                 <a:ln>
                   <a:noFill/>
                 </a:ln>
                 <a:solidFill>
-                  <a:srgbClr val="FF0000"/>
+                  <a:srgbClr val="000000"/>
                 </a:solidFill>
                 <a:effectLst/>
                 <a:latin typeface="Arial Unicode MS"/>
                 <a:ea typeface="Courier New" panose="02070309020205020404" pitchFamily="49" charset="0"/>
               </a:rPr>
-              <a:t>('like', 'dislike')</a:t>
-            </a:r>
-            <a:r>
-              <a:rPr kumimoji="0" lang="en-US" altLang="en-US" sz="1800" b="0" i="0" u="none" strike="noStrike" cap="none" normalizeH="0" baseline="0" dirty="0">
+              <a:t>, ('like', 'unlike'), </a:t>
+            </a:r>
+            <a:r>
+              <a:rPr kumimoji="0" lang="en-US" altLang="en-US" sz="2000" b="0" i="0" u="none" strike="noStrike" cap="none" normalizeH="0" baseline="0" dirty="0">
                 <a:ln>
                   <a:noFill/>
                 </a:ln>
                 <a:solidFill>
-                  <a:srgbClr val="000000"/>
+                  <a:srgbClr val="FF0000"/>
                 </a:solidFill>
                 <a:effectLst/>
                 <a:latin typeface="Arial Unicode MS"/>
                 <a:ea typeface="Courier New" panose="02070309020205020404" pitchFamily="49" charset="0"/>
               </a:rPr>
-              <a:t>, ('like', 'unlike'), </a:t>
-            </a:r>
-            <a:r>
-              <a:rPr kumimoji="0" lang="en-US" altLang="en-US" sz="1800" b="0" i="0" u="none" strike="noStrike" cap="none" normalizeH="0" baseline="0" dirty="0">
+              <a:t>('traditional', 'nontraditional'), </a:t>
+            </a:r>
+            <a:r>
+              <a:rPr kumimoji="0" lang="en-US" altLang="en-US" sz="2000" b="0" i="0" u="none" strike="noStrike" cap="none" normalizeH="0" baseline="0" dirty="0">
                 <a:ln>
                   <a:noFill/>
                 </a:ln>
                 <a:solidFill>
-                  <a:srgbClr val="FF0000"/>
+                  <a:srgbClr val="000000"/>
                 </a:solidFill>
                 <a:effectLst/>
                 <a:latin typeface="Arial Unicode MS"/>
                 <a:ea typeface="Courier New" panose="02070309020205020404" pitchFamily="49" charset="0"/>
               </a:rPr>
-              <a:t>('traditional', 'nontraditional'), </a:t>
-            </a:r>
-            <a:r>
-              <a:rPr kumimoji="0" lang="en-US" altLang="en-US" sz="1800" b="0" i="0" u="none" strike="noStrike" cap="none" normalizeH="0" baseline="0" dirty="0">
+              <a:t>('equal', 'differ'), ('most', 'fewest'), ('most', 'least'), ('on', 'off’),  </a:t>
+            </a:r>
+            <a:r>
+              <a:rPr kumimoji="0" lang="en-US" altLang="en-US" sz="2000" b="0" i="0" u="none" strike="noStrike" cap="none" normalizeH="0" baseline="0" dirty="0">
                 <a:ln>
                   <a:noFill/>
                 </a:ln>
                 <a:solidFill>
-                  <a:srgbClr val="000000"/>
+                  <a:srgbClr val="FF0000"/>
                 </a:solidFill>
                 <a:effectLst/>
                 <a:latin typeface="Arial Unicode MS"/>
                 <a:ea typeface="Courier New" panose="02070309020205020404" pitchFamily="49" charset="0"/>
               </a:rPr>
-              <a:t>('equal', 'differ'), ('most', 'fewest'), ('most', 'least'), ('on', 'off’),  ('western', 'eastern'), ('many', 'few'), ('deviate', 'conform'), ('take', 'give'), ('accept', 'refuse'), ('necessitate', 'obviate'), ('consume', 'abstain'), ('claim', 'disclaim’),  (</a:t>
-            </a:r>
-            <a:r>
-              <a:rPr kumimoji="0" lang="en-US" altLang="en-US" sz="1800" b="0" i="0" u="none" strike="noStrike" cap="none" normalizeH="0" baseline="0" dirty="0">
+              <a:t>('western', 'eastern')</a:t>
+            </a:r>
+            <a:r>
+              <a:rPr kumimoji="0" lang="en-US" altLang="en-US" sz="2000" b="0" i="0" u="none" strike="noStrike" cap="none" normalizeH="0" baseline="0" dirty="0">
                 <a:ln>
                   <a:noFill/>
                 </a:ln>
                 <a:solidFill>
-                  <a:srgbClr val="FF0000"/>
+                  <a:srgbClr val="000000"/>
                 </a:solidFill>
                 <a:effectLst/>
                 <a:latin typeface="Arial Unicode MS"/>
                 <a:ea typeface="Courier New" panose="02070309020205020404" pitchFamily="49" charset="0"/>
               </a:rPr>
-              <a:t>'sound', 'silence')</a:t>
-            </a:r>
-            <a:r>
-              <a:rPr kumimoji="0" lang="en-US" altLang="en-US" sz="1800" b="0" i="0" u="none" strike="noStrike" cap="none" normalizeH="0" baseline="0" dirty="0">
+              <a:t>, ('many', 'few'), ('deviate', 'conform'), ('take', 'give'), ('accept', 'refuse'), ('necessitate', 'obviate'), ('consume', 'abstain'), ('claim', 'disclaim’),  (</a:t>
+            </a:r>
+            <a:r>
+              <a:rPr kumimoji="0" lang="en-US" altLang="en-US" sz="2000" b="0" i="0" u="none" strike="noStrike" cap="none" normalizeH="0" baseline="0" dirty="0">
                 <a:ln>
                   <a:noFill/>
                 </a:ln>
                 <a:solidFill>
-                  <a:srgbClr val="000000"/>
+                  <a:srgbClr val="FF0000"/>
                 </a:solidFill>
                 <a:effectLst/>
                 <a:latin typeface="Arial Unicode MS"/>
                 <a:ea typeface="Courier New" panose="02070309020205020404" pitchFamily="49" charset="0"/>
               </a:rPr>
-              <a:t>, ('have', 'lack'), </a:t>
-            </a:r>
-            <a:r>
-              <a:rPr kumimoji="0" lang="en-US" altLang="en-US" sz="1800" b="0" i="0" u="none" strike="noStrike" cap="none" normalizeH="0" baseline="0" dirty="0">
+              <a:t>'sound', 'silence')</a:t>
+            </a:r>
+            <a:r>
+              <a:rPr kumimoji="0" lang="en-US" altLang="en-US" sz="2000" b="0" i="0" u="none" strike="noStrike" cap="none" normalizeH="0" baseline="0" dirty="0">
                 <a:ln>
                   <a:noFill/>
                 </a:ln>
                 <a:solidFill>
-                  <a:srgbClr val="FF0000"/>
+                  <a:srgbClr val="000000"/>
                 </a:solidFill>
                 <a:effectLst/>
                 <a:latin typeface="Arial Unicode MS"/>
                 <a:ea typeface="Courier New" panose="02070309020205020404" pitchFamily="49" charset="0"/>
               </a:rPr>
-              <a:t>('new', 'old')</a:t>
-            </a:r>
-            <a:r>
-              <a:rPr kumimoji="0" lang="en-US" altLang="en-US" sz="1800" b="0" i="0" u="none" strike="noStrike" cap="none" normalizeH="0" baseline="0" dirty="0">
+              <a:t>, ('have', 'lack'), </a:t>
+            </a:r>
+            <a:r>
+              <a:rPr kumimoji="0" lang="en-US" altLang="en-US" sz="2000" b="0" i="0" u="none" strike="noStrike" cap="none" normalizeH="0" baseline="0" dirty="0">
                 <a:ln>
                   <a:noFill/>
                 </a:ln>
                 <a:solidFill>
-                  <a:srgbClr val="000000"/>
+                  <a:srgbClr val="FF0000"/>
                 </a:solidFill>
                 <a:effectLst/>
                 <a:latin typeface="Arial Unicode MS"/>
                 <a:ea typeface="Courier New" panose="02070309020205020404" pitchFamily="49" charset="0"/>
               </a:rPr>
-              <a:t>, ('new', 'worn'), ('adopted', 'native'), ('record', 'erase'), ('studio', 'location'), ('particular', 'general'), ('specific', 'general’),  ('specific', 'nonspecific'), ('used', 'misused'), ('general', 'particular'), ('general', 'specific'), ('general', 'local'), ('more', 'less'), ('more', 'fewer'), ('familiar', 'unfamiliar'), ('familiar', 'strange’), ('win', 'lose'), ('gain', 'reduce'), (</a:t>
-            </a:r>
-            <a:r>
-              <a:rPr kumimoji="0" lang="en-US" altLang="en-US" sz="1800" b="0" i="0" u="none" strike="noStrike" cap="none" normalizeH="0" baseline="0" dirty="0">
+              <a:t>('new', 'old')</a:t>
+            </a:r>
+            <a:r>
+              <a:rPr kumimoji="0" lang="en-US" altLang="en-US" sz="2000" b="0" i="0" u="none" strike="noStrike" cap="none" normalizeH="0" baseline="0" dirty="0">
                 <a:ln>
                   <a:noFill/>
                 </a:ln>
                 <a:solidFill>
-                  <a:srgbClr val="FF0000"/>
+                  <a:srgbClr val="000000"/>
                 </a:solidFill>
                 <a:effectLst/>
                 <a:latin typeface="Arial Unicode MS"/>
                 <a:ea typeface="Courier New" panose="02070309020205020404" pitchFamily="49" charset="0"/>
               </a:rPr>
-              <a:t>'popularity', 'unpopularity</a:t>
-            </a:r>
-            <a:r>
-              <a:rPr kumimoji="0" lang="en-US" altLang="en-US" sz="1800" b="0" i="0" u="none" strike="noStrike" cap="none" normalizeH="0" baseline="0" dirty="0">
+              <a:t>, ('new', 'worn'), ('adopted', 'native'), ('record', 'erase'), ('studio', 'location'), ('particular', 'general'), ('specific', 'general’),  ('specific', 'nonspecific'), ('used', 'misused'), ('general', 'particular'), ('general', 'specific'), ('general', 'local'), ('more', 'less'), ('more', 'fewer'), ('familiar', 'unfamiliar'), ('familiar', 'strange’), ('win', 'lose'), ('gain', 'reduce'), (</a:t>
+            </a:r>
+            <a:r>
+              <a:rPr kumimoji="0" lang="en-US" altLang="en-US" sz="2000" b="0" i="0" u="none" strike="noStrike" cap="none" normalizeH="0" baseline="0" dirty="0">
                 <a:ln>
                   <a:noFill/>
                 </a:ln>
                 <a:solidFill>
-                  <a:srgbClr val="000000"/>
+                  <a:srgbClr val="FF0000"/>
                 </a:solidFill>
                 <a:effectLst/>
                 <a:latin typeface="Arial Unicode MS"/>
                 <a:ea typeface="Courier New" panose="02070309020205020404" pitchFamily="49" charset="0"/>
               </a:rPr>
-              <a:t>'), ('powerful', 'powerless'), ('appearance', 'disappearance'), ('late', 'early'), ('begin', 'end'), ('start', 'stop'), ('cover</a:t>
-            </a:r>
-            <a:r>
-              <a:rPr kumimoji="0" lang="en-US" altLang="en-US" sz="1800" b="0" i="0" u="none" strike="noStrike" cap="none" normalizeH="0" baseline="0">
+              <a:t>'popularity', 'unpopularity</a:t>
+            </a:r>
+            <a:r>
+              <a:rPr kumimoji="0" lang="en-US" altLang="en-US" sz="2000" b="0" i="0" u="none" strike="noStrike" cap="none" normalizeH="0" baseline="0" dirty="0">
                 <a:ln>
                   <a:noFill/>
                 </a:ln>
@@ -5119,9 +6594,9 @@
                 <a:latin typeface="Arial Unicode MS"/>
                 <a:ea typeface="Courier New" panose="02070309020205020404" pitchFamily="49" charset="0"/>
               </a:rPr>
-              <a:t>', 'uncover’)</a:t>
-            </a:r>
-            <a:endParaRPr kumimoji="0" lang="en-US" altLang="en-US" sz="4000" b="0" i="0" u="none" strike="noStrike" cap="none" normalizeH="0" baseline="0" dirty="0">
+              <a:t>'), ('powerful', 'powerless'), ('appearance', 'disappearance'), ('late', 'early'), ('begin', 'end'), ('start', 'stop'), ('cover', 'uncover’)</a:t>
+            </a:r>
+            <a:endParaRPr kumimoji="0" lang="en-US" altLang="en-US" sz="4400" b="0" i="0" u="none" strike="noStrike" cap="none" normalizeH="0" baseline="0" dirty="0">
               <a:ln>
                 <a:noFill/>
               </a:ln>
@@ -5138,6 +6613,1740 @@
     <p:extLst>
       <p:ext uri="{BB962C8B-B14F-4D97-AF65-F5344CB8AC3E}">
         <p14:creationId xmlns:p14="http://schemas.microsoft.com/office/powerpoint/2010/main" val="239633301"/>
+      </p:ext>
+    </p:extLst>
+  </p:cSld>
+  <p:clrMapOvr>
+    <a:masterClrMapping/>
+  </p:clrMapOvr>
+</p:sld>
+</file>
+
+<file path=ppt/slides/slide8.xml><?xml version="1.0" encoding="utf-8"?>
+<p:sld xmlns:a="http://schemas.openxmlformats.org/drawingml/2006/main" xmlns:r="http://schemas.openxmlformats.org/officeDocument/2006/relationships" xmlns:p="http://schemas.openxmlformats.org/presentationml/2006/main">
+  <p:cSld>
+    <p:spTree>
+      <p:nvGrpSpPr>
+        <p:cNvPr id="1" name=""/>
+        <p:cNvGrpSpPr/>
+        <p:nvPr/>
+      </p:nvGrpSpPr>
+      <p:grpSpPr>
+        <a:xfrm>
+          <a:off x="0" y="0"/>
+          <a:ext cx="0" cy="0"/>
+          <a:chOff x="0" y="0"/>
+          <a:chExt cx="0" cy="0"/>
+        </a:xfrm>
+      </p:grpSpPr>
+      <p:sp>
+        <p:nvSpPr>
+          <p:cNvPr id="2" name="Titel 1">
+            <a:extLst>
+              <a:ext uri="{FF2B5EF4-FFF2-40B4-BE49-F238E27FC236}">
+                <a16:creationId xmlns:a16="http://schemas.microsoft.com/office/drawing/2014/main" id="{F245AA07-2C04-4A90-B333-2CE6F5D1272F}"/>
+              </a:ext>
+            </a:extLst>
+          </p:cNvPr>
+          <p:cNvSpPr>
+            <a:spLocks noGrp="1"/>
+          </p:cNvSpPr>
+          <p:nvPr>
+            <p:ph type="title"/>
+          </p:nvPr>
+        </p:nvSpPr>
+        <p:spPr>
+          <a:xfrm>
+            <a:off x="838200" y="-121437"/>
+            <a:ext cx="10515600" cy="1325563"/>
+          </a:xfrm>
+        </p:spPr>
+        <p:txBody>
+          <a:bodyPr/>
+          <a:lstStyle/>
+          <a:p>
+            <a:r>
+              <a:rPr lang="en-US" dirty="0"/>
+              <a:t>First Conclusion: We need some “Guidance”</a:t>
+            </a:r>
+          </a:p>
+        </p:txBody>
+      </p:sp>
+      <p:sp>
+        <p:nvSpPr>
+          <p:cNvPr id="3" name="Inhaltsplatzhalter 2">
+            <a:extLst>
+              <a:ext uri="{FF2B5EF4-FFF2-40B4-BE49-F238E27FC236}">
+                <a16:creationId xmlns:a16="http://schemas.microsoft.com/office/drawing/2014/main" id="{230019AF-E97D-4664-B0E7-9FBB96A60E22}"/>
+              </a:ext>
+            </a:extLst>
+          </p:cNvPr>
+          <p:cNvSpPr>
+            <a:spLocks noGrp="1"/>
+          </p:cNvSpPr>
+          <p:nvPr>
+            <p:ph idx="1"/>
+          </p:nvPr>
+        </p:nvSpPr>
+        <p:spPr>
+          <a:xfrm>
+            <a:off x="838200" y="869279"/>
+            <a:ext cx="10515600" cy="951131"/>
+          </a:xfrm>
+        </p:spPr>
+        <p:txBody>
+          <a:bodyPr>
+            <a:normAutofit lnSpcReduction="10000"/>
+          </a:bodyPr>
+          <a:lstStyle/>
+          <a:p>
+            <a:r>
+              <a:rPr lang="en-US" dirty="0"/>
+              <a:t>“Hard code“ 50 Category specific Pairs</a:t>
+            </a:r>
+          </a:p>
+          <a:p>
+            <a:r>
+              <a:rPr lang="en-US" dirty="0"/>
+              <a:t>Example Country: Observation: Many don’t have “real” antonyms</a:t>
+            </a:r>
+          </a:p>
+          <a:p>
+            <a:pPr marL="0" indent="0">
+              <a:buNone/>
+            </a:pPr>
+            <a:endParaRPr lang="en-US" dirty="0"/>
+          </a:p>
+          <a:p>
+            <a:endParaRPr lang="en-US" dirty="0"/>
+          </a:p>
+        </p:txBody>
+      </p:sp>
+      <p:sp>
+        <p:nvSpPr>
+          <p:cNvPr id="5" name="Textfeld 4">
+            <a:extLst>
+              <a:ext uri="{FF2B5EF4-FFF2-40B4-BE49-F238E27FC236}">
+                <a16:creationId xmlns:a16="http://schemas.microsoft.com/office/drawing/2014/main" id="{7741D961-6975-4DAB-B1AC-204E6915C720}"/>
+              </a:ext>
+            </a:extLst>
+          </p:cNvPr>
+          <p:cNvSpPr txBox="1"/>
+          <p:nvPr/>
+        </p:nvSpPr>
+        <p:spPr>
+          <a:xfrm>
+            <a:off x="730367" y="1661019"/>
+            <a:ext cx="2776756" cy="5909310"/>
+          </a:xfrm>
+          <a:prstGeom prst="rect">
+            <a:avLst/>
+          </a:prstGeom>
+          <a:noFill/>
+        </p:spPr>
+        <p:txBody>
+          <a:bodyPr wrap="square" rtlCol="0">
+            <a:spAutoFit/>
+          </a:bodyPr>
+          <a:lstStyle/>
+          <a:p>
+            <a:r>
+              <a:rPr lang="en-US" b="1" dirty="0"/>
+              <a:t>Geographic</a:t>
+            </a:r>
+          </a:p>
+          <a:p>
+            <a:r>
+              <a:rPr lang="en-US" dirty="0"/>
+              <a:t>east west</a:t>
+            </a:r>
+          </a:p>
+          <a:p>
+            <a:r>
+              <a:rPr lang="en-US" dirty="0"/>
+              <a:t>north south</a:t>
+            </a:r>
+          </a:p>
+          <a:p>
+            <a:r>
+              <a:rPr lang="en-US" dirty="0" err="1">
+                <a:solidFill>
+                  <a:schemeClr val="accent1">
+                    <a:lumMod val="50000"/>
+                  </a:schemeClr>
+                </a:solidFill>
+              </a:rPr>
+              <a:t>europa</a:t>
+            </a:r>
+            <a:r>
+              <a:rPr lang="en-US" dirty="0">
+                <a:solidFill>
+                  <a:schemeClr val="accent1">
+                    <a:lumMod val="50000"/>
+                  </a:schemeClr>
+                </a:solidFill>
+              </a:rPr>
+              <a:t> </a:t>
+            </a:r>
+            <a:r>
+              <a:rPr lang="en-US" dirty="0" err="1">
+                <a:solidFill>
+                  <a:schemeClr val="accent1">
+                    <a:lumMod val="50000"/>
+                  </a:schemeClr>
+                </a:solidFill>
+              </a:rPr>
+              <a:t>asia</a:t>
+            </a:r>
+            <a:endParaRPr lang="en-US" dirty="0">
+              <a:solidFill>
+                <a:schemeClr val="accent1">
+                  <a:lumMod val="50000"/>
+                </a:schemeClr>
+              </a:solidFill>
+            </a:endParaRPr>
+          </a:p>
+          <a:p>
+            <a:r>
+              <a:rPr lang="en-US" dirty="0" err="1">
+                <a:solidFill>
+                  <a:schemeClr val="accent1">
+                    <a:lumMod val="50000"/>
+                  </a:schemeClr>
+                </a:solidFill>
+              </a:rPr>
+              <a:t>america</a:t>
+            </a:r>
+            <a:r>
+              <a:rPr lang="en-US" dirty="0">
+                <a:solidFill>
+                  <a:schemeClr val="accent1">
+                    <a:lumMod val="50000"/>
+                  </a:schemeClr>
+                </a:solidFill>
+              </a:rPr>
+              <a:t> </a:t>
+            </a:r>
+            <a:r>
+              <a:rPr lang="en-US" dirty="0" err="1">
+                <a:solidFill>
+                  <a:schemeClr val="accent1">
+                    <a:lumMod val="50000"/>
+                  </a:schemeClr>
+                </a:solidFill>
+              </a:rPr>
+              <a:t>eurasien</a:t>
+            </a:r>
+            <a:endParaRPr lang="en-US" dirty="0">
+              <a:solidFill>
+                <a:schemeClr val="accent1">
+                  <a:lumMod val="50000"/>
+                </a:schemeClr>
+              </a:solidFill>
+            </a:endParaRPr>
+          </a:p>
+          <a:p>
+            <a:r>
+              <a:rPr lang="en-US" dirty="0" err="1">
+                <a:solidFill>
+                  <a:schemeClr val="accent1">
+                    <a:lumMod val="50000"/>
+                  </a:schemeClr>
+                </a:solidFill>
+              </a:rPr>
+              <a:t>africa</a:t>
+            </a:r>
+            <a:r>
+              <a:rPr lang="en-US" dirty="0">
+                <a:solidFill>
+                  <a:schemeClr val="accent1">
+                    <a:lumMod val="50000"/>
+                  </a:schemeClr>
+                </a:solidFill>
+              </a:rPr>
+              <a:t> </a:t>
+            </a:r>
+            <a:r>
+              <a:rPr lang="en-US" dirty="0" err="1">
+                <a:solidFill>
+                  <a:schemeClr val="accent1">
+                    <a:lumMod val="50000"/>
+                  </a:schemeClr>
+                </a:solidFill>
+              </a:rPr>
+              <a:t>australia</a:t>
+            </a:r>
+            <a:endParaRPr lang="en-US" dirty="0">
+              <a:solidFill>
+                <a:schemeClr val="accent1">
+                  <a:lumMod val="50000"/>
+                </a:schemeClr>
+              </a:solidFill>
+            </a:endParaRPr>
+          </a:p>
+          <a:p>
+            <a:r>
+              <a:rPr lang="en-US" dirty="0" err="1">
+                <a:solidFill>
+                  <a:schemeClr val="accent1">
+                    <a:lumMod val="50000"/>
+                  </a:schemeClr>
+                </a:solidFill>
+              </a:rPr>
+              <a:t>scandinavian</a:t>
+            </a:r>
+            <a:r>
+              <a:rPr lang="en-US" dirty="0">
+                <a:solidFill>
+                  <a:schemeClr val="accent1">
+                    <a:lumMod val="50000"/>
+                  </a:schemeClr>
+                </a:solidFill>
+              </a:rPr>
+              <a:t> </a:t>
+            </a:r>
+            <a:r>
+              <a:rPr lang="en-US" dirty="0" err="1">
+                <a:solidFill>
+                  <a:schemeClr val="accent1">
+                    <a:lumMod val="50000"/>
+                  </a:schemeClr>
+                </a:solidFill>
+              </a:rPr>
+              <a:t>baltic</a:t>
+            </a:r>
+            <a:endParaRPr lang="en-US" dirty="0">
+              <a:solidFill>
+                <a:schemeClr val="accent1">
+                  <a:lumMod val="50000"/>
+                </a:schemeClr>
+              </a:solidFill>
+            </a:endParaRPr>
+          </a:p>
+          <a:p>
+            <a:r>
+              <a:rPr lang="en-US" dirty="0" err="1">
+                <a:solidFill>
+                  <a:schemeClr val="accent1">
+                    <a:lumMod val="50000"/>
+                  </a:schemeClr>
+                </a:solidFill>
+              </a:rPr>
+              <a:t>america</a:t>
+            </a:r>
+            <a:r>
+              <a:rPr lang="en-US" dirty="0">
+                <a:solidFill>
+                  <a:schemeClr val="accent1">
+                    <a:lumMod val="50000"/>
+                  </a:schemeClr>
+                </a:solidFill>
+              </a:rPr>
+              <a:t> </a:t>
+            </a:r>
+            <a:r>
+              <a:rPr lang="en-US" dirty="0" err="1">
+                <a:solidFill>
+                  <a:schemeClr val="accent1">
+                    <a:lumMod val="50000"/>
+                  </a:schemeClr>
+                </a:solidFill>
+              </a:rPr>
+              <a:t>russia</a:t>
+            </a:r>
+            <a:endParaRPr lang="en-US" dirty="0">
+              <a:solidFill>
+                <a:schemeClr val="accent1">
+                  <a:lumMod val="50000"/>
+                </a:schemeClr>
+              </a:solidFill>
+            </a:endParaRPr>
+          </a:p>
+          <a:p>
+            <a:r>
+              <a:rPr lang="en-US" dirty="0" err="1">
+                <a:solidFill>
+                  <a:schemeClr val="accent1">
+                    <a:lumMod val="50000"/>
+                  </a:schemeClr>
+                </a:solidFill>
+              </a:rPr>
+              <a:t>america</a:t>
+            </a:r>
+            <a:r>
+              <a:rPr lang="en-US" dirty="0">
+                <a:solidFill>
+                  <a:schemeClr val="accent1">
+                    <a:lumMod val="50000"/>
+                  </a:schemeClr>
+                </a:solidFill>
+              </a:rPr>
+              <a:t> china</a:t>
+            </a:r>
+          </a:p>
+          <a:p>
+            <a:r>
+              <a:rPr lang="en-US" dirty="0" err="1">
+                <a:solidFill>
+                  <a:schemeClr val="accent1">
+                    <a:lumMod val="50000"/>
+                  </a:schemeClr>
+                </a:solidFill>
+              </a:rPr>
+              <a:t>russia</a:t>
+            </a:r>
+            <a:r>
+              <a:rPr lang="en-US" dirty="0">
+                <a:solidFill>
+                  <a:schemeClr val="accent1">
+                    <a:lumMod val="50000"/>
+                  </a:schemeClr>
+                </a:solidFill>
+              </a:rPr>
+              <a:t> china</a:t>
+            </a:r>
+          </a:p>
+          <a:p>
+            <a:r>
+              <a:rPr lang="en-US" dirty="0" err="1">
+                <a:solidFill>
+                  <a:schemeClr val="accent1">
+                    <a:lumMod val="50000"/>
+                  </a:schemeClr>
+                </a:solidFill>
+              </a:rPr>
+              <a:t>atlantic</a:t>
+            </a:r>
+            <a:r>
+              <a:rPr lang="en-US" dirty="0">
+                <a:solidFill>
+                  <a:schemeClr val="accent1">
+                    <a:lumMod val="50000"/>
+                  </a:schemeClr>
+                </a:solidFill>
+              </a:rPr>
+              <a:t> pacific</a:t>
+            </a:r>
+          </a:p>
+          <a:p>
+            <a:endParaRPr lang="en-US" dirty="0"/>
+          </a:p>
+          <a:p>
+            <a:r>
+              <a:rPr lang="en-US" b="1" dirty="0"/>
+              <a:t>Language</a:t>
+            </a:r>
+            <a:r>
+              <a:rPr lang="en-US" dirty="0"/>
+              <a:t>:</a:t>
+            </a:r>
+          </a:p>
+          <a:p>
+            <a:r>
+              <a:rPr lang="en-US" dirty="0" err="1">
+                <a:solidFill>
+                  <a:schemeClr val="accent1">
+                    <a:lumMod val="50000"/>
+                  </a:schemeClr>
+                </a:solidFill>
+              </a:rPr>
+              <a:t>latino</a:t>
+            </a:r>
+            <a:r>
+              <a:rPr lang="en-US" dirty="0">
+                <a:solidFill>
+                  <a:schemeClr val="accent1">
+                    <a:lumMod val="50000"/>
+                  </a:schemeClr>
+                </a:solidFill>
+              </a:rPr>
+              <a:t> </a:t>
+            </a:r>
+            <a:r>
+              <a:rPr lang="en-US" dirty="0" err="1">
+                <a:solidFill>
+                  <a:schemeClr val="accent1">
+                    <a:lumMod val="50000"/>
+                  </a:schemeClr>
+                </a:solidFill>
+              </a:rPr>
+              <a:t>hispanic</a:t>
+            </a:r>
+            <a:endParaRPr lang="en-US" dirty="0">
+              <a:solidFill>
+                <a:schemeClr val="accent1">
+                  <a:lumMod val="50000"/>
+                </a:schemeClr>
+              </a:solidFill>
+            </a:endParaRPr>
+          </a:p>
+          <a:p>
+            <a:r>
+              <a:rPr lang="en-US" dirty="0" err="1">
+                <a:solidFill>
+                  <a:schemeClr val="accent1">
+                    <a:lumMod val="50000"/>
+                  </a:schemeClr>
+                </a:solidFill>
+              </a:rPr>
+              <a:t>english</a:t>
+            </a:r>
+            <a:r>
+              <a:rPr lang="en-US" dirty="0">
+                <a:solidFill>
+                  <a:schemeClr val="accent1">
+                    <a:lumMod val="50000"/>
+                  </a:schemeClr>
+                </a:solidFill>
+              </a:rPr>
+              <a:t> </a:t>
+            </a:r>
+            <a:r>
+              <a:rPr lang="en-US" dirty="0" err="1">
+                <a:solidFill>
+                  <a:schemeClr val="accent1">
+                    <a:lumMod val="50000"/>
+                  </a:schemeClr>
+                </a:solidFill>
+              </a:rPr>
+              <a:t>russian</a:t>
+            </a:r>
+            <a:endParaRPr lang="en-US" dirty="0">
+              <a:solidFill>
+                <a:schemeClr val="accent1">
+                  <a:lumMod val="50000"/>
+                </a:schemeClr>
+              </a:solidFill>
+            </a:endParaRPr>
+          </a:p>
+          <a:p>
+            <a:r>
+              <a:rPr lang="en-US" dirty="0" err="1">
+                <a:solidFill>
+                  <a:schemeClr val="accent1">
+                    <a:lumMod val="50000"/>
+                  </a:schemeClr>
+                </a:solidFill>
+              </a:rPr>
+              <a:t>english</a:t>
+            </a:r>
+            <a:r>
+              <a:rPr lang="en-US" dirty="0">
+                <a:solidFill>
+                  <a:schemeClr val="accent1">
+                    <a:lumMod val="50000"/>
+                  </a:schemeClr>
+                </a:solidFill>
+              </a:rPr>
+              <a:t> </a:t>
+            </a:r>
+            <a:r>
+              <a:rPr lang="en-US" dirty="0" err="1">
+                <a:solidFill>
+                  <a:schemeClr val="accent1">
+                    <a:lumMod val="50000"/>
+                  </a:schemeClr>
+                </a:solidFill>
+              </a:rPr>
+              <a:t>chinese</a:t>
+            </a:r>
+            <a:endParaRPr lang="en-US" dirty="0">
+              <a:solidFill>
+                <a:schemeClr val="accent1">
+                  <a:lumMod val="50000"/>
+                </a:schemeClr>
+              </a:solidFill>
+            </a:endParaRPr>
+          </a:p>
+          <a:p>
+            <a:r>
+              <a:rPr lang="en-US" dirty="0" err="1">
+                <a:solidFill>
+                  <a:schemeClr val="accent1">
+                    <a:lumMod val="50000"/>
+                  </a:schemeClr>
+                </a:solidFill>
+              </a:rPr>
+              <a:t>english</a:t>
+            </a:r>
+            <a:r>
+              <a:rPr lang="en-US" dirty="0">
+                <a:solidFill>
+                  <a:schemeClr val="accent1">
+                    <a:lumMod val="50000"/>
+                  </a:schemeClr>
+                </a:solidFill>
+              </a:rPr>
+              <a:t> </a:t>
+            </a:r>
+            <a:r>
+              <a:rPr lang="en-US" dirty="0" err="1">
+                <a:solidFill>
+                  <a:schemeClr val="accent1">
+                    <a:lumMod val="50000"/>
+                  </a:schemeClr>
+                </a:solidFill>
+              </a:rPr>
+              <a:t>spanish</a:t>
+            </a:r>
+            <a:endParaRPr lang="en-US" dirty="0">
+              <a:solidFill>
+                <a:schemeClr val="accent1">
+                  <a:lumMod val="50000"/>
+                </a:schemeClr>
+              </a:solidFill>
+            </a:endParaRPr>
+          </a:p>
+          <a:p>
+            <a:r>
+              <a:rPr lang="en-US" dirty="0" err="1">
+                <a:solidFill>
+                  <a:schemeClr val="accent1">
+                    <a:lumMod val="50000"/>
+                  </a:schemeClr>
+                </a:solidFill>
+              </a:rPr>
+              <a:t>spanish</a:t>
+            </a:r>
+            <a:r>
+              <a:rPr lang="en-US" dirty="0">
+                <a:solidFill>
+                  <a:schemeClr val="accent1">
+                    <a:lumMod val="50000"/>
+                  </a:schemeClr>
+                </a:solidFill>
+              </a:rPr>
+              <a:t> </a:t>
+            </a:r>
+            <a:r>
+              <a:rPr lang="en-US" dirty="0" err="1">
+                <a:solidFill>
+                  <a:schemeClr val="accent1">
+                    <a:lumMod val="50000"/>
+                  </a:schemeClr>
+                </a:solidFill>
+              </a:rPr>
+              <a:t>portuguese</a:t>
+            </a:r>
+            <a:endParaRPr lang="en-US" dirty="0">
+              <a:solidFill>
+                <a:schemeClr val="accent1">
+                  <a:lumMod val="50000"/>
+                </a:schemeClr>
+              </a:solidFill>
+            </a:endParaRPr>
+          </a:p>
+          <a:p>
+            <a:endParaRPr lang="en-US" dirty="0"/>
+          </a:p>
+          <a:p>
+            <a:endParaRPr lang="en-US" dirty="0"/>
+          </a:p>
+          <a:p>
+            <a:endParaRPr lang="en-US" dirty="0"/>
+          </a:p>
+        </p:txBody>
+      </p:sp>
+      <p:sp>
+        <p:nvSpPr>
+          <p:cNvPr id="6" name="Textfeld 5">
+            <a:extLst>
+              <a:ext uri="{FF2B5EF4-FFF2-40B4-BE49-F238E27FC236}">
+                <a16:creationId xmlns:a16="http://schemas.microsoft.com/office/drawing/2014/main" id="{DB8A2132-AD93-4CD7-8029-74BB1093BBF4}"/>
+              </a:ext>
+            </a:extLst>
+          </p:cNvPr>
+          <p:cNvSpPr txBox="1"/>
+          <p:nvPr/>
+        </p:nvSpPr>
+        <p:spPr>
+          <a:xfrm>
+            <a:off x="3704001" y="1661019"/>
+            <a:ext cx="2776756" cy="5355312"/>
+          </a:xfrm>
+          <a:prstGeom prst="rect">
+            <a:avLst/>
+          </a:prstGeom>
+          <a:noFill/>
+        </p:spPr>
+        <p:txBody>
+          <a:bodyPr wrap="square" rtlCol="0">
+            <a:spAutoFit/>
+          </a:bodyPr>
+          <a:lstStyle/>
+          <a:p>
+            <a:r>
+              <a:rPr lang="en-US" b="1" dirty="0"/>
+              <a:t>Landscape</a:t>
+            </a:r>
+            <a:r>
+              <a:rPr lang="en-US" dirty="0"/>
+              <a:t>:</a:t>
+            </a:r>
+          </a:p>
+          <a:p>
+            <a:r>
+              <a:rPr lang="en-US" dirty="0">
+                <a:solidFill>
+                  <a:schemeClr val="accent1">
+                    <a:lumMod val="50000"/>
+                  </a:schemeClr>
+                </a:solidFill>
+              </a:rPr>
+              <a:t>ocean land</a:t>
+            </a:r>
+          </a:p>
+          <a:p>
+            <a:r>
+              <a:rPr lang="en-US" dirty="0"/>
+              <a:t>large small</a:t>
+            </a:r>
+          </a:p>
+          <a:p>
+            <a:r>
+              <a:rPr lang="en-US" dirty="0">
+                <a:solidFill>
+                  <a:schemeClr val="accent1">
+                    <a:lumMod val="50000"/>
+                  </a:schemeClr>
+                </a:solidFill>
+              </a:rPr>
+              <a:t>arctic</a:t>
+            </a:r>
+            <a:r>
+              <a:rPr lang="en-US" dirty="0"/>
+              <a:t> southern</a:t>
+            </a:r>
+          </a:p>
+          <a:p>
+            <a:r>
+              <a:rPr lang="en-US" dirty="0">
+                <a:solidFill>
+                  <a:schemeClr val="accent1">
+                    <a:lumMod val="50000"/>
+                  </a:schemeClr>
+                </a:solidFill>
+              </a:rPr>
+              <a:t>island neighbor</a:t>
+            </a:r>
+          </a:p>
+          <a:p>
+            <a:r>
+              <a:rPr lang="en-US" dirty="0"/>
+              <a:t>flat </a:t>
+            </a:r>
+            <a:r>
+              <a:rPr lang="en-US" dirty="0">
+                <a:solidFill>
+                  <a:schemeClr val="accent1">
+                    <a:lumMod val="50000"/>
+                  </a:schemeClr>
+                </a:solidFill>
+              </a:rPr>
+              <a:t>mountain</a:t>
+            </a:r>
+          </a:p>
+          <a:p>
+            <a:r>
+              <a:rPr lang="en-US" dirty="0">
+                <a:solidFill>
+                  <a:schemeClr val="accent1">
+                    <a:lumMod val="50000"/>
+                  </a:schemeClr>
+                </a:solidFill>
+              </a:rPr>
+              <a:t>coast border</a:t>
+            </a:r>
+          </a:p>
+          <a:p>
+            <a:r>
+              <a:rPr lang="en-US" dirty="0"/>
+              <a:t>metropolitan rural</a:t>
+            </a:r>
+          </a:p>
+          <a:p>
+            <a:r>
+              <a:rPr lang="en-US" dirty="0"/>
+              <a:t>cityside countryside</a:t>
+            </a:r>
+          </a:p>
+          <a:p>
+            <a:r>
+              <a:rPr lang="en-US" dirty="0"/>
+              <a:t>big tiny</a:t>
+            </a:r>
+          </a:p>
+          <a:p>
+            <a:r>
+              <a:rPr lang="en-US" dirty="0"/>
+              <a:t>long wide</a:t>
+            </a:r>
+          </a:p>
+          <a:p>
+            <a:endParaRPr lang="en-US" dirty="0"/>
+          </a:p>
+          <a:p>
+            <a:r>
+              <a:rPr lang="en-US" dirty="0"/>
+              <a:t>Colors:</a:t>
+            </a:r>
+          </a:p>
+          <a:p>
+            <a:r>
+              <a:rPr lang="en-US" dirty="0"/>
+              <a:t>black white</a:t>
+            </a:r>
+          </a:p>
+          <a:p>
+            <a:r>
+              <a:rPr lang="en-US" dirty="0"/>
+              <a:t>brown white</a:t>
+            </a:r>
+          </a:p>
+          <a:p>
+            <a:r>
+              <a:rPr lang="en-US" dirty="0"/>
+              <a:t>yellow white</a:t>
+            </a:r>
+          </a:p>
+          <a:p>
+            <a:r>
+              <a:rPr lang="en-US" dirty="0"/>
+              <a:t>grey green</a:t>
+            </a:r>
+          </a:p>
+          <a:p>
+            <a:r>
+              <a:rPr lang="en-US" dirty="0"/>
+              <a:t>grey blue</a:t>
+            </a:r>
+          </a:p>
+          <a:p>
+            <a:endParaRPr lang="en-US" dirty="0"/>
+          </a:p>
+        </p:txBody>
+      </p:sp>
+      <p:sp>
+        <p:nvSpPr>
+          <p:cNvPr id="7" name="Textfeld 6">
+            <a:extLst>
+              <a:ext uri="{FF2B5EF4-FFF2-40B4-BE49-F238E27FC236}">
+                <a16:creationId xmlns:a16="http://schemas.microsoft.com/office/drawing/2014/main" id="{C5FC919A-A610-4688-8C88-A09689730808}"/>
+              </a:ext>
+            </a:extLst>
+          </p:cNvPr>
+          <p:cNvSpPr txBox="1"/>
+          <p:nvPr/>
+        </p:nvSpPr>
+        <p:spPr>
+          <a:xfrm>
+            <a:off x="6319138" y="1661019"/>
+            <a:ext cx="3296874" cy="3693319"/>
+          </a:xfrm>
+          <a:prstGeom prst="rect">
+            <a:avLst/>
+          </a:prstGeom>
+          <a:noFill/>
+        </p:spPr>
+        <p:txBody>
+          <a:bodyPr wrap="square" rtlCol="0">
+            <a:spAutoFit/>
+          </a:bodyPr>
+          <a:lstStyle/>
+          <a:p>
+            <a:r>
+              <a:rPr lang="en-US" b="1" dirty="0"/>
+              <a:t>Politics&amp; People:</a:t>
+            </a:r>
+          </a:p>
+          <a:p>
+            <a:r>
+              <a:rPr lang="en-US" dirty="0"/>
+              <a:t>civilized uncivilized</a:t>
+            </a:r>
+          </a:p>
+          <a:p>
+            <a:r>
+              <a:rPr lang="en-US" dirty="0"/>
+              <a:t>modern traditional</a:t>
+            </a:r>
+          </a:p>
+          <a:p>
+            <a:r>
+              <a:rPr lang="en-US" dirty="0">
+                <a:solidFill>
+                  <a:schemeClr val="accent1">
+                    <a:lumMod val="50000"/>
+                  </a:schemeClr>
+                </a:solidFill>
+              </a:rPr>
+              <a:t>catholic </a:t>
+            </a:r>
+            <a:r>
+              <a:rPr lang="en-US" dirty="0" err="1">
+                <a:solidFill>
+                  <a:schemeClr val="accent1">
+                    <a:lumMod val="50000"/>
+                  </a:schemeClr>
+                </a:solidFill>
+              </a:rPr>
+              <a:t>muslim</a:t>
+            </a:r>
+            <a:endParaRPr lang="en-US" dirty="0">
+              <a:solidFill>
+                <a:schemeClr val="accent1">
+                  <a:lumMod val="50000"/>
+                </a:schemeClr>
+              </a:solidFill>
+            </a:endParaRPr>
+          </a:p>
+          <a:p>
+            <a:r>
+              <a:rPr lang="en-US" dirty="0">
+                <a:solidFill>
+                  <a:schemeClr val="accent1">
+                    <a:lumMod val="50000"/>
+                  </a:schemeClr>
+                </a:solidFill>
+              </a:rPr>
+              <a:t>catholic </a:t>
+            </a:r>
+            <a:r>
+              <a:rPr lang="en-US" dirty="0" err="1">
+                <a:solidFill>
+                  <a:schemeClr val="accent1">
+                    <a:lumMod val="50000"/>
+                  </a:schemeClr>
+                </a:solidFill>
+              </a:rPr>
+              <a:t>buddhism</a:t>
+            </a:r>
+            <a:endParaRPr lang="en-US" dirty="0">
+              <a:solidFill>
+                <a:schemeClr val="accent1">
+                  <a:lumMod val="50000"/>
+                </a:schemeClr>
+              </a:solidFill>
+            </a:endParaRPr>
+          </a:p>
+          <a:p>
+            <a:r>
+              <a:rPr lang="en-US" dirty="0" err="1">
+                <a:solidFill>
+                  <a:schemeClr val="accent1">
+                    <a:lumMod val="50000"/>
+                  </a:schemeClr>
+                </a:solidFill>
+              </a:rPr>
+              <a:t>hindi</a:t>
+            </a:r>
+            <a:r>
+              <a:rPr lang="en-US" dirty="0">
+                <a:solidFill>
+                  <a:schemeClr val="accent1">
+                    <a:lumMod val="50000"/>
+                  </a:schemeClr>
+                </a:solidFill>
+              </a:rPr>
+              <a:t> </a:t>
+            </a:r>
+            <a:r>
+              <a:rPr lang="en-US" dirty="0" err="1">
+                <a:solidFill>
+                  <a:schemeClr val="accent1">
+                    <a:lumMod val="50000"/>
+                  </a:schemeClr>
+                </a:solidFill>
+              </a:rPr>
+              <a:t>muslim</a:t>
+            </a:r>
+            <a:endParaRPr lang="en-US" dirty="0">
+              <a:solidFill>
+                <a:schemeClr val="accent1">
+                  <a:lumMod val="50000"/>
+                </a:schemeClr>
+              </a:solidFill>
+            </a:endParaRPr>
+          </a:p>
+          <a:p>
+            <a:r>
+              <a:rPr lang="en-US" dirty="0"/>
+              <a:t>democratic monarchic</a:t>
+            </a:r>
+          </a:p>
+          <a:p>
+            <a:r>
+              <a:rPr lang="en-US" dirty="0">
+                <a:solidFill>
+                  <a:schemeClr val="accent1">
+                    <a:lumMod val="50000"/>
+                  </a:schemeClr>
+                </a:solidFill>
+              </a:rPr>
+              <a:t>potato rice</a:t>
+            </a:r>
+          </a:p>
+          <a:p>
+            <a:r>
+              <a:rPr lang="en-US" dirty="0"/>
+              <a:t>calm busy</a:t>
+            </a:r>
+          </a:p>
+          <a:p>
+            <a:r>
+              <a:rPr lang="en-US" dirty="0"/>
+              <a:t>cosmopolitan provincial</a:t>
+            </a:r>
+          </a:p>
+          <a:p>
+            <a:r>
+              <a:rPr lang="en-US" dirty="0"/>
+              <a:t>touristy limited</a:t>
+            </a:r>
+          </a:p>
+          <a:p>
+            <a:endParaRPr lang="en-US" dirty="0"/>
+          </a:p>
+          <a:p>
+            <a:endParaRPr lang="en-US" dirty="0"/>
+          </a:p>
+        </p:txBody>
+      </p:sp>
+      <p:sp>
+        <p:nvSpPr>
+          <p:cNvPr id="8" name="Textfeld 7">
+            <a:extLst>
+              <a:ext uri="{FF2B5EF4-FFF2-40B4-BE49-F238E27FC236}">
+                <a16:creationId xmlns:a16="http://schemas.microsoft.com/office/drawing/2014/main" id="{6BC21772-013C-486E-A692-4798404D0CB9}"/>
+              </a:ext>
+            </a:extLst>
+          </p:cNvPr>
+          <p:cNvSpPr txBox="1"/>
+          <p:nvPr/>
+        </p:nvSpPr>
+        <p:spPr>
+          <a:xfrm>
+            <a:off x="9370502" y="1669407"/>
+            <a:ext cx="2586606" cy="5078313"/>
+          </a:xfrm>
+          <a:prstGeom prst="rect">
+            <a:avLst/>
+          </a:prstGeom>
+          <a:noFill/>
+        </p:spPr>
+        <p:txBody>
+          <a:bodyPr wrap="square" rtlCol="0">
+            <a:spAutoFit/>
+          </a:bodyPr>
+          <a:lstStyle/>
+          <a:p>
+            <a:r>
+              <a:rPr lang="en-US" b="1" dirty="0"/>
+              <a:t>Weather:</a:t>
+            </a:r>
+          </a:p>
+          <a:p>
+            <a:r>
+              <a:rPr lang="en-US" dirty="0"/>
+              <a:t>dry humid</a:t>
+            </a:r>
+          </a:p>
+          <a:p>
+            <a:r>
+              <a:rPr lang="en-US" dirty="0"/>
+              <a:t>hot cold</a:t>
+            </a:r>
+          </a:p>
+          <a:p>
+            <a:r>
+              <a:rPr lang="en-US" dirty="0"/>
+              <a:t>tropical </a:t>
+            </a:r>
+            <a:r>
+              <a:rPr lang="en-US" dirty="0" err="1"/>
+              <a:t>mediterranean</a:t>
+            </a:r>
+            <a:endParaRPr lang="en-US" dirty="0"/>
+          </a:p>
+          <a:p>
+            <a:r>
+              <a:rPr lang="en-US" dirty="0"/>
+              <a:t>desert vegetation</a:t>
+            </a:r>
+          </a:p>
+          <a:p>
+            <a:endParaRPr lang="en-US" dirty="0"/>
+          </a:p>
+          <a:p>
+            <a:endParaRPr lang="en-US" dirty="0"/>
+          </a:p>
+          <a:p>
+            <a:r>
+              <a:rPr lang="en-US" b="1" dirty="0"/>
+              <a:t>Money making</a:t>
+            </a:r>
+            <a:r>
+              <a:rPr lang="en-US" dirty="0"/>
+              <a:t>:</a:t>
+            </a:r>
+          </a:p>
+          <a:p>
+            <a:r>
+              <a:rPr lang="en-US" dirty="0"/>
+              <a:t>export import</a:t>
+            </a:r>
+          </a:p>
+          <a:p>
+            <a:r>
+              <a:rPr lang="en-US" dirty="0">
+                <a:solidFill>
+                  <a:schemeClr val="accent1">
+                    <a:lumMod val="50000"/>
+                  </a:schemeClr>
+                </a:solidFill>
+              </a:rPr>
+              <a:t>banking agriculture</a:t>
+            </a:r>
+          </a:p>
+          <a:p>
+            <a:r>
+              <a:rPr lang="en-US" dirty="0">
+                <a:solidFill>
+                  <a:schemeClr val="accent1">
+                    <a:lumMod val="50000"/>
+                  </a:schemeClr>
+                </a:solidFill>
+              </a:rPr>
+              <a:t>port airport</a:t>
+            </a:r>
+          </a:p>
+          <a:p>
+            <a:r>
+              <a:rPr lang="en-US" dirty="0"/>
+              <a:t>developed undeveloped</a:t>
+            </a:r>
+          </a:p>
+          <a:p>
+            <a:r>
+              <a:rPr lang="en-US" dirty="0">
+                <a:solidFill>
+                  <a:schemeClr val="accent1">
+                    <a:lumMod val="50000"/>
+                  </a:schemeClr>
+                </a:solidFill>
+              </a:rPr>
+              <a:t>first third</a:t>
+            </a:r>
+          </a:p>
+          <a:p>
+            <a:r>
+              <a:rPr lang="en-US" dirty="0"/>
+              <a:t>poor rich</a:t>
+            </a:r>
+          </a:p>
+          <a:p>
+            <a:r>
+              <a:rPr lang="en-US" dirty="0"/>
+              <a:t>farming development</a:t>
+            </a:r>
+          </a:p>
+          <a:p>
+            <a:endParaRPr lang="en-US" dirty="0"/>
+          </a:p>
+          <a:p>
+            <a:endParaRPr lang="en-US" dirty="0"/>
+          </a:p>
+          <a:p>
+            <a:endParaRPr lang="en-US" dirty="0"/>
+          </a:p>
+        </p:txBody>
+      </p:sp>
+    </p:spTree>
+    <p:extLst>
+      <p:ext uri="{BB962C8B-B14F-4D97-AF65-F5344CB8AC3E}">
+        <p14:creationId xmlns:p14="http://schemas.microsoft.com/office/powerpoint/2010/main" val="3137182267"/>
+      </p:ext>
+    </p:extLst>
+  </p:cSld>
+  <p:clrMapOvr>
+    <a:masterClrMapping/>
+  </p:clrMapOvr>
+</p:sld>
+</file>
+
+<file path=ppt/slides/slide9.xml><?xml version="1.0" encoding="utf-8"?>
+<p:sld xmlns:a="http://schemas.openxmlformats.org/drawingml/2006/main" xmlns:r="http://schemas.openxmlformats.org/officeDocument/2006/relationships" xmlns:p="http://schemas.openxmlformats.org/presentationml/2006/main">
+  <p:cSld>
+    <p:spTree>
+      <p:nvGrpSpPr>
+        <p:cNvPr id="1" name=""/>
+        <p:cNvGrpSpPr/>
+        <p:nvPr/>
+      </p:nvGrpSpPr>
+      <p:grpSpPr>
+        <a:xfrm>
+          <a:off x="0" y="0"/>
+          <a:ext cx="0" cy="0"/>
+          <a:chOff x="0" y="0"/>
+          <a:chExt cx="0" cy="0"/>
+        </a:xfrm>
+      </p:grpSpPr>
+      <p:sp>
+        <p:nvSpPr>
+          <p:cNvPr id="2" name="Titel 1">
+            <a:extLst>
+              <a:ext uri="{FF2B5EF4-FFF2-40B4-BE49-F238E27FC236}">
+                <a16:creationId xmlns:a16="http://schemas.microsoft.com/office/drawing/2014/main" id="{6FCFAA34-4E5E-487B-99CF-8DB1198E86DA}"/>
+              </a:ext>
+            </a:extLst>
+          </p:cNvPr>
+          <p:cNvSpPr>
+            <a:spLocks noGrp="1"/>
+          </p:cNvSpPr>
+          <p:nvPr>
+            <p:ph type="title"/>
+          </p:nvPr>
+        </p:nvSpPr>
+        <p:spPr/>
+        <p:txBody>
+          <a:bodyPr/>
+          <a:lstStyle/>
+          <a:p>
+            <a:r>
+              <a:rPr lang="en-US" dirty="0"/>
+              <a:t>4. Approach</a:t>
+            </a:r>
+          </a:p>
+        </p:txBody>
+      </p:sp>
+      <p:sp>
+        <p:nvSpPr>
+          <p:cNvPr id="3" name="Inhaltsplatzhalter 2">
+            <a:extLst>
+              <a:ext uri="{FF2B5EF4-FFF2-40B4-BE49-F238E27FC236}">
+                <a16:creationId xmlns:a16="http://schemas.microsoft.com/office/drawing/2014/main" id="{A50ABEB7-3A79-4239-9AAC-4C1CB3C4D40A}"/>
+              </a:ext>
+            </a:extLst>
+          </p:cNvPr>
+          <p:cNvSpPr>
+            <a:spLocks noGrp="1"/>
+          </p:cNvSpPr>
+          <p:nvPr>
+            <p:ph idx="1"/>
+          </p:nvPr>
+        </p:nvSpPr>
+        <p:spPr>
+          <a:xfrm>
+            <a:off x="838200" y="1825625"/>
+            <a:ext cx="10515600" cy="1481101"/>
+          </a:xfrm>
+        </p:spPr>
+        <p:txBody>
+          <a:bodyPr>
+            <a:normAutofit lnSpcReduction="10000"/>
+          </a:bodyPr>
+          <a:lstStyle/>
+          <a:p>
+            <a:r>
+              <a:rPr lang="en-US" dirty="0"/>
+              <a:t>Start with hardcoded 50 antonyms</a:t>
+            </a:r>
+          </a:p>
+          <a:p>
+            <a:r>
+              <a:rPr lang="en-US" dirty="0"/>
+              <a:t>Instead of using synonyms, use similar words</a:t>
+            </a:r>
+          </a:p>
+          <a:p>
+            <a:r>
+              <a:rPr lang="en-US" dirty="0"/>
+              <a:t>Example: ("salty", "sweet")</a:t>
+            </a:r>
+          </a:p>
+          <a:p>
+            <a:endParaRPr lang="en-US" dirty="0"/>
+          </a:p>
+        </p:txBody>
+      </p:sp>
+      <p:sp>
+        <p:nvSpPr>
+          <p:cNvPr id="4" name="Textfeld 3">
+            <a:extLst>
+              <a:ext uri="{FF2B5EF4-FFF2-40B4-BE49-F238E27FC236}">
+                <a16:creationId xmlns:a16="http://schemas.microsoft.com/office/drawing/2014/main" id="{9C34AA00-2259-48EB-9681-96DDFEF16696}"/>
+              </a:ext>
+            </a:extLst>
+          </p:cNvPr>
+          <p:cNvSpPr txBox="1"/>
+          <p:nvPr/>
+        </p:nvSpPr>
+        <p:spPr>
+          <a:xfrm>
+            <a:off x="838200" y="3199666"/>
+            <a:ext cx="5257800" cy="3447098"/>
+          </a:xfrm>
+          <a:prstGeom prst="rect">
+            <a:avLst/>
+          </a:prstGeom>
+          <a:noFill/>
+        </p:spPr>
+        <p:txBody>
+          <a:bodyPr wrap="square" rtlCol="0">
+            <a:spAutoFit/>
+          </a:bodyPr>
+          <a:lstStyle/>
+          <a:p>
+            <a:pPr lvl="0" eaLnBrk="0" fontAlgn="base" hangingPunct="0">
+              <a:spcBef>
+                <a:spcPct val="0"/>
+              </a:spcBef>
+              <a:spcAft>
+                <a:spcPct val="0"/>
+              </a:spcAft>
+            </a:pPr>
+            <a:r>
+              <a:rPr lang="en-US" altLang="en-US" dirty="0">
+                <a:solidFill>
+                  <a:srgbClr val="000000"/>
+                </a:solidFill>
+                <a:latin typeface="Arial Unicode MS"/>
+                <a:ea typeface="Courier New" panose="02070309020205020404" pitchFamily="49" charset="0"/>
+              </a:rPr>
+              <a:t>Using word2vec.wv.most_similar()</a:t>
+            </a:r>
+          </a:p>
+          <a:p>
+            <a:pPr lvl="0" eaLnBrk="0" fontAlgn="base" hangingPunct="0">
+              <a:spcBef>
+                <a:spcPct val="0"/>
+              </a:spcBef>
+              <a:spcAft>
+                <a:spcPct val="0"/>
+              </a:spcAft>
+            </a:pPr>
+            <a:r>
+              <a:rPr lang="en-US" altLang="en-US" dirty="0">
+                <a:solidFill>
+                  <a:srgbClr val="000000"/>
+                </a:solidFill>
+                <a:latin typeface="Arial Unicode MS"/>
+                <a:ea typeface="Courier New" panose="02070309020205020404" pitchFamily="49" charset="0"/>
+              </a:rPr>
+              <a:t>[('salty', 'sweet'), ('tangy', 'sweet'), </a:t>
+            </a:r>
+            <a:r>
+              <a:rPr lang="en-US" altLang="en-US" dirty="0">
+                <a:solidFill>
+                  <a:srgbClr val="FF0000"/>
+                </a:solidFill>
+                <a:latin typeface="Arial Unicode MS"/>
+                <a:ea typeface="Courier New" panose="02070309020205020404" pitchFamily="49" charset="0"/>
+              </a:rPr>
+              <a:t>('</a:t>
+            </a:r>
+            <a:r>
+              <a:rPr lang="en-US" altLang="en-US" dirty="0" err="1">
+                <a:solidFill>
+                  <a:srgbClr val="FF0000"/>
+                </a:solidFill>
+                <a:latin typeface="Arial Unicode MS"/>
+                <a:ea typeface="Courier New" panose="02070309020205020404" pitchFamily="49" charset="0"/>
+              </a:rPr>
+              <a:t>savoury</a:t>
+            </a:r>
+            <a:r>
+              <a:rPr lang="en-US" altLang="en-US" dirty="0">
+                <a:solidFill>
+                  <a:srgbClr val="FF0000"/>
+                </a:solidFill>
+                <a:latin typeface="Arial Unicode MS"/>
+                <a:ea typeface="Courier New" panose="02070309020205020404" pitchFamily="49" charset="0"/>
+              </a:rPr>
+              <a:t>', 'tasteless')</a:t>
+            </a:r>
+            <a:r>
+              <a:rPr lang="en-US" altLang="en-US" dirty="0">
+                <a:solidFill>
+                  <a:srgbClr val="000000"/>
+                </a:solidFill>
+                <a:latin typeface="Arial Unicode MS"/>
+                <a:ea typeface="Courier New" panose="02070309020205020404" pitchFamily="49" charset="0"/>
+              </a:rPr>
+              <a:t>, </a:t>
+            </a:r>
+            <a:r>
+              <a:rPr lang="en-US" altLang="en-US" dirty="0">
+                <a:solidFill>
+                  <a:srgbClr val="FF0000"/>
+                </a:solidFill>
+                <a:latin typeface="Arial Unicode MS"/>
+                <a:ea typeface="Courier New" panose="02070309020205020404" pitchFamily="49" charset="0"/>
+              </a:rPr>
+              <a:t>('pungent', 'tasteless’)</a:t>
+            </a:r>
+            <a:r>
+              <a:rPr lang="en-US" altLang="en-US" dirty="0">
+                <a:solidFill>
+                  <a:srgbClr val="000000"/>
+                </a:solidFill>
+                <a:latin typeface="Arial Unicode MS"/>
+                <a:ea typeface="Courier New" panose="02070309020205020404" pitchFamily="49" charset="0"/>
+              </a:rPr>
+              <a:t> ('fruity', 'sane'), ('fruity', 'tasteless'), ('sour', 'tasteless'), ('sour', 'fragrant'), </a:t>
+            </a:r>
+            <a:r>
+              <a:rPr lang="en-US" altLang="en-US" dirty="0">
+                <a:solidFill>
+                  <a:srgbClr val="FF0000"/>
+                </a:solidFill>
+                <a:latin typeface="Arial Unicode MS"/>
+                <a:ea typeface="Courier New" panose="02070309020205020404" pitchFamily="49" charset="0"/>
+              </a:rPr>
+              <a:t>('sour', 'sweet')</a:t>
+            </a:r>
+            <a:r>
+              <a:rPr lang="en-US" altLang="en-US" dirty="0">
+                <a:solidFill>
+                  <a:srgbClr val="000000"/>
+                </a:solidFill>
+                <a:latin typeface="Arial Unicode MS"/>
+                <a:ea typeface="Courier New" panose="02070309020205020404" pitchFamily="49" charset="0"/>
+              </a:rPr>
+              <a:t>, ('sour', 'cloying'), ('sour', 'harmonious'), ('sour', 'syrupy'), ('sour', 'sweeten'), ('sour', 'honeyed'), ('sour', 'luscious'), ('sour', 'wholesome'), ('sour', 'untainted'), </a:t>
+            </a:r>
+            <a:r>
+              <a:rPr lang="en-US" altLang="en-US" dirty="0">
+                <a:solidFill>
+                  <a:srgbClr val="FF0000"/>
+                </a:solidFill>
+                <a:latin typeface="Arial Unicode MS"/>
+                <a:ea typeface="Courier New" panose="02070309020205020404" pitchFamily="49" charset="0"/>
+              </a:rPr>
+              <a:t>('spicy', 'tasteless')</a:t>
+            </a:r>
+            <a:r>
+              <a:rPr lang="en-US" altLang="en-US" dirty="0">
+                <a:solidFill>
+                  <a:srgbClr val="000000"/>
+                </a:solidFill>
+                <a:latin typeface="Arial Unicode MS"/>
+                <a:ea typeface="Courier New" panose="02070309020205020404" pitchFamily="49" charset="0"/>
+              </a:rPr>
+              <a:t>, ('spicy', 'cold'), ('spicy', 'dull’)]</a:t>
+            </a:r>
+            <a:r>
+              <a:rPr lang="en-US" altLang="en-US" sz="1400" dirty="0"/>
+              <a:t> </a:t>
+            </a:r>
+          </a:p>
+          <a:p>
+            <a:pPr lvl="0" eaLnBrk="0" fontAlgn="base" hangingPunct="0">
+              <a:spcBef>
+                <a:spcPct val="0"/>
+              </a:spcBef>
+              <a:spcAft>
+                <a:spcPct val="0"/>
+              </a:spcAft>
+            </a:pPr>
+            <a:endParaRPr lang="en-US" altLang="en-US" sz="1400" dirty="0">
+              <a:latin typeface="Arial" panose="020B0604020202020204" pitchFamily="34" charset="0"/>
+            </a:endParaRPr>
+          </a:p>
+          <a:p>
+            <a:pPr lvl="0" eaLnBrk="0" fontAlgn="base" hangingPunct="0">
+              <a:spcBef>
+                <a:spcPct val="0"/>
+              </a:spcBef>
+              <a:spcAft>
+                <a:spcPct val="0"/>
+              </a:spcAft>
+            </a:pPr>
+            <a:r>
+              <a:rPr lang="en-US" altLang="en-US" sz="1400" dirty="0">
+                <a:latin typeface="Arial" panose="020B0604020202020204" pitchFamily="34" charset="0"/>
+              </a:rPr>
+              <a:t>Pungent: having a sharply strong taste or smell.</a:t>
+            </a:r>
+          </a:p>
+          <a:p>
+            <a:pPr lvl="0" eaLnBrk="0" fontAlgn="base" hangingPunct="0">
+              <a:spcBef>
+                <a:spcPct val="0"/>
+              </a:spcBef>
+              <a:spcAft>
+                <a:spcPct val="0"/>
+              </a:spcAft>
+            </a:pPr>
+            <a:r>
+              <a:rPr lang="en-US" sz="1400" dirty="0">
+                <a:latin typeface="Arial" panose="020B0604020202020204" pitchFamily="34" charset="0"/>
+                <a:cs typeface="Arial" panose="020B0604020202020204" pitchFamily="34" charset="0"/>
+              </a:rPr>
+              <a:t>tangy flavor: or smell is one that is sharp, especially a </a:t>
+            </a:r>
+            <a:r>
+              <a:rPr lang="en-US" sz="1400" dirty="0" err="1">
+                <a:latin typeface="Arial" panose="020B0604020202020204" pitchFamily="34" charset="0"/>
+                <a:cs typeface="Arial" panose="020B0604020202020204" pitchFamily="34" charset="0"/>
+              </a:rPr>
+              <a:t>flavour</a:t>
+            </a:r>
+            <a:r>
+              <a:rPr lang="en-US" sz="1400" dirty="0">
+                <a:latin typeface="Arial" panose="020B0604020202020204" pitchFamily="34" charset="0"/>
+                <a:cs typeface="Arial" panose="020B0604020202020204" pitchFamily="34" charset="0"/>
+              </a:rPr>
+              <a:t> like that of lemon juice</a:t>
+            </a:r>
+            <a:endParaRPr lang="en-US" altLang="en-US" sz="1400" dirty="0">
+              <a:latin typeface="Arial" panose="020B0604020202020204" pitchFamily="34" charset="0"/>
+              <a:cs typeface="Arial" panose="020B0604020202020204" pitchFamily="34" charset="0"/>
+            </a:endParaRPr>
+          </a:p>
+        </p:txBody>
+      </p:sp>
+      <p:sp>
+        <p:nvSpPr>
+          <p:cNvPr id="5" name="Rectangle 1">
+            <a:extLst>
+              <a:ext uri="{FF2B5EF4-FFF2-40B4-BE49-F238E27FC236}">
+                <a16:creationId xmlns:a16="http://schemas.microsoft.com/office/drawing/2014/main" id="{F44F6714-9F31-4706-974D-127CD7C9BBEB}"/>
+              </a:ext>
+            </a:extLst>
+          </p:cNvPr>
+          <p:cNvSpPr>
+            <a:spLocks noChangeArrowheads="1"/>
+          </p:cNvSpPr>
+          <p:nvPr/>
+        </p:nvSpPr>
+        <p:spPr bwMode="auto">
+          <a:xfrm>
+            <a:off x="0" y="90100"/>
+            <a:ext cx="65" cy="276999"/>
+          </a:xfrm>
+          <a:prstGeom prst="rect">
+            <a:avLst/>
+          </a:prstGeom>
+          <a:solidFill>
+            <a:srgbClr val="FFFFFF"/>
+          </a:solidFill>
+          <a:ln>
+            <a:noFill/>
+          </a:ln>
+          <a:effectLst/>
+          <a:extLst>
+            <a:ext uri="{91240B29-F687-4F45-9708-019B960494DF}">
+              <a14:hiddenLine xmlns:a14="http://schemas.microsoft.com/office/drawing/2010/main" w="9525">
+                <a:solidFill>
+                  <a:schemeClr val="tx1"/>
+                </a:solidFill>
+                <a:miter lim="800000"/>
+                <a:headEnd/>
+                <a:tailEnd/>
+              </a14:hiddenLine>
+            </a:ext>
+            <a:ext uri="{AF507438-7753-43E0-B8FC-AC1667EBCBE1}">
+              <a14:hiddenEffects xmlns:a14="http://schemas.microsoft.com/office/drawing/2010/main">
+                <a:effectLst>
+                  <a:outerShdw dist="35921" dir="2700000" algn="ctr" rotWithShape="0">
+                    <a:schemeClr val="bg2"/>
+                  </a:outerShdw>
+                </a:effectLst>
+              </a14:hiddenEffects>
+            </a:ext>
+          </a:extLst>
+        </p:spPr>
+        <p:txBody>
+          <a:bodyPr vert="horz" wrap="none" lIns="0" tIns="0" rIns="0" bIns="0" numCol="1" anchor="ctr" anchorCtr="0" compatLnSpc="1">
+            <a:prstTxWarp prst="textNoShape">
+              <a:avLst/>
+            </a:prstTxWarp>
+            <a:spAutoFit/>
+          </a:bodyPr>
+          <a:lstStyle/>
+          <a:p>
+            <a:pPr marL="0" marR="0" lvl="0" indent="0" algn="l" defTabSz="914400" rtl="0" eaLnBrk="0" fontAlgn="base" latinLnBrk="0" hangingPunct="0">
+              <a:lnSpc>
+                <a:spcPct val="100000"/>
+              </a:lnSpc>
+              <a:spcBef>
+                <a:spcPct val="0"/>
+              </a:spcBef>
+              <a:spcAft>
+                <a:spcPct val="0"/>
+              </a:spcAft>
+              <a:buClrTx/>
+              <a:buSzTx/>
+              <a:buFontTx/>
+              <a:buNone/>
+              <a:tabLst/>
+            </a:pPr>
+            <a:endParaRPr kumimoji="0" lang="en-US" altLang="en-US" sz="1800" b="0" i="0" u="none" strike="noStrike" cap="none" normalizeH="0" baseline="0" dirty="0">
+              <a:ln>
+                <a:noFill/>
+              </a:ln>
+              <a:solidFill>
+                <a:schemeClr val="tx1"/>
+              </a:solidFill>
+              <a:effectLst/>
+              <a:latin typeface="Arial" panose="020B0604020202020204" pitchFamily="34" charset="0"/>
+            </a:endParaRPr>
+          </a:p>
+        </p:txBody>
+      </p:sp>
+      <p:sp>
+        <p:nvSpPr>
+          <p:cNvPr id="6" name="Rectangle 2">
+            <a:extLst>
+              <a:ext uri="{FF2B5EF4-FFF2-40B4-BE49-F238E27FC236}">
+                <a16:creationId xmlns:a16="http://schemas.microsoft.com/office/drawing/2014/main" id="{F9E2F259-52A6-42CF-B485-76336FA4AEEF}"/>
+              </a:ext>
+            </a:extLst>
+          </p:cNvPr>
+          <p:cNvSpPr>
+            <a:spLocks noChangeArrowheads="1"/>
+          </p:cNvSpPr>
+          <p:nvPr/>
+        </p:nvSpPr>
+        <p:spPr bwMode="auto">
+          <a:xfrm>
+            <a:off x="0" y="90101"/>
+            <a:ext cx="4625163" cy="276999"/>
+          </a:xfrm>
+          <a:prstGeom prst="rect">
+            <a:avLst/>
+          </a:prstGeom>
+          <a:solidFill>
+            <a:srgbClr val="FFFFFF"/>
+          </a:solidFill>
+          <a:ln>
+            <a:noFill/>
+          </a:ln>
+          <a:effectLst/>
+          <a:extLst>
+            <a:ext uri="{91240B29-F687-4F45-9708-019B960494DF}">
+              <a14:hiddenLine xmlns:a14="http://schemas.microsoft.com/office/drawing/2010/main" w="9525">
+                <a:solidFill>
+                  <a:schemeClr val="tx1"/>
+                </a:solidFill>
+                <a:miter lim="800000"/>
+                <a:headEnd/>
+                <a:tailEnd/>
+              </a14:hiddenLine>
+            </a:ext>
+            <a:ext uri="{AF507438-7753-43E0-B8FC-AC1667EBCBE1}">
+              <a14:hiddenEffects xmlns:a14="http://schemas.microsoft.com/office/drawing/2010/main">
+                <a:effectLst>
+                  <a:outerShdw dist="35921" dir="2700000" algn="ctr" rotWithShape="0">
+                    <a:schemeClr val="bg2"/>
+                  </a:outerShdw>
+                </a:effectLst>
+              </a14:hiddenEffects>
+            </a:ext>
+          </a:extLst>
+        </p:spPr>
+        <p:txBody>
+          <a:bodyPr vert="horz" wrap="square" lIns="0" tIns="0" rIns="0" bIns="0" numCol="1" anchor="ctr" anchorCtr="0" compatLnSpc="1">
+            <a:prstTxWarp prst="textNoShape">
+              <a:avLst/>
+            </a:prstTxWarp>
+            <a:spAutoFit/>
+          </a:bodyPr>
+          <a:lstStyle/>
+          <a:p>
+            <a:pPr marL="0" marR="0" lvl="0" indent="0" algn="l" defTabSz="914400" rtl="0" eaLnBrk="0" fontAlgn="base" latinLnBrk="0" hangingPunct="0">
+              <a:lnSpc>
+                <a:spcPct val="100000"/>
+              </a:lnSpc>
+              <a:spcBef>
+                <a:spcPct val="0"/>
+              </a:spcBef>
+              <a:spcAft>
+                <a:spcPct val="0"/>
+              </a:spcAft>
+              <a:buClrTx/>
+              <a:buSzTx/>
+              <a:buFontTx/>
+              <a:buNone/>
+              <a:tabLst/>
+            </a:pPr>
+            <a:endParaRPr kumimoji="0" lang="en-US" altLang="en-US" sz="1800" b="0" i="0" u="none" strike="noStrike" cap="none" normalizeH="0" baseline="0" dirty="0">
+              <a:ln>
+                <a:noFill/>
+              </a:ln>
+              <a:solidFill>
+                <a:schemeClr val="tx1"/>
+              </a:solidFill>
+              <a:effectLst/>
+              <a:latin typeface="Arial" panose="020B0604020202020204" pitchFamily="34" charset="0"/>
+            </a:endParaRPr>
+          </a:p>
+        </p:txBody>
+      </p:sp>
+      <p:sp>
+        <p:nvSpPr>
+          <p:cNvPr id="7" name="Textfeld 6">
+            <a:extLst>
+              <a:ext uri="{FF2B5EF4-FFF2-40B4-BE49-F238E27FC236}">
+                <a16:creationId xmlns:a16="http://schemas.microsoft.com/office/drawing/2014/main" id="{848FA59A-E965-49B1-8759-A8EFC51F6348}"/>
+              </a:ext>
+            </a:extLst>
+          </p:cNvPr>
+          <p:cNvSpPr txBox="1"/>
+          <p:nvPr/>
+        </p:nvSpPr>
+        <p:spPr>
+          <a:xfrm>
+            <a:off x="5821324" y="3314550"/>
+            <a:ext cx="6119037" cy="923330"/>
+          </a:xfrm>
+          <a:prstGeom prst="rect">
+            <a:avLst/>
+          </a:prstGeom>
+          <a:noFill/>
+        </p:spPr>
+        <p:txBody>
+          <a:bodyPr wrap="square" rtlCol="0">
+            <a:spAutoFit/>
+          </a:bodyPr>
+          <a:lstStyle/>
+          <a:p>
+            <a:r>
+              <a:rPr lang="en-US" altLang="en-US" dirty="0">
+                <a:solidFill>
+                  <a:srgbClr val="000000"/>
+                </a:solidFill>
+                <a:latin typeface="Arial Unicode MS"/>
+                <a:ea typeface="Courier New" panose="02070309020205020404" pitchFamily="49" charset="0"/>
+              </a:rPr>
+              <a:t>Using synonyms:</a:t>
+            </a:r>
+          </a:p>
+          <a:p>
+            <a:r>
+              <a:rPr lang="en-US" altLang="en-US" dirty="0">
+                <a:solidFill>
+                  <a:srgbClr val="000000"/>
+                </a:solidFill>
+                <a:latin typeface="Arial Unicode MS"/>
+                <a:ea typeface="Courier New" panose="02070309020205020404" pitchFamily="49" charset="0"/>
+              </a:rPr>
+              <a:t>[('sweetness', 'unpleasantness')]</a:t>
+            </a:r>
+            <a:endParaRPr lang="en-US" altLang="en-US" sz="4000" dirty="0">
+              <a:latin typeface="Arial" panose="020B0604020202020204" pitchFamily="34" charset="0"/>
+            </a:endParaRPr>
+          </a:p>
+          <a:p>
+            <a:endParaRPr lang="en-US" dirty="0"/>
+          </a:p>
+        </p:txBody>
+      </p:sp>
+    </p:spTree>
+    <p:extLst>
+      <p:ext uri="{BB962C8B-B14F-4D97-AF65-F5344CB8AC3E}">
+        <p14:creationId xmlns:p14="http://schemas.microsoft.com/office/powerpoint/2010/main" val="1959512540"/>
       </p:ext>
     </p:extLst>
   </p:cSld>

</xml_diff>